<commit_message>
Finishing before recording video
</commit_message>
<xml_diff>
--- a/submission/A3_DocumentNumber_4_sacha_schwab.pptx
+++ b/submission/A3_DocumentNumber_4_sacha_schwab.pptx
@@ -10,12 +10,12 @@
   <p:sldIdLst>
     <p:sldId id="259" r:id="rId2"/>
     <p:sldId id="261" r:id="rId3"/>
-    <p:sldId id="266" r:id="rId4"/>
-    <p:sldId id="267" r:id="rId5"/>
-    <p:sldId id="263" r:id="rId6"/>
-    <p:sldId id="268" r:id="rId7"/>
-    <p:sldId id="264" r:id="rId8"/>
-    <p:sldId id="260" r:id="rId9"/>
+    <p:sldId id="260" r:id="rId4"/>
+    <p:sldId id="266" r:id="rId5"/>
+    <p:sldId id="267" r:id="rId6"/>
+    <p:sldId id="263" r:id="rId7"/>
+    <p:sldId id="268" r:id="rId8"/>
+    <p:sldId id="264" r:id="rId9"/>
   </p:sldIdLst>
   <p:sldSz cx="12192000" cy="6858000"/>
   <p:notesSz cx="6858000" cy="9144000"/>
@@ -714,7 +714,7 @@
     </p:spTree>
     <p:extLst>
       <p:ext uri="{BB962C8B-B14F-4D97-AF65-F5344CB8AC3E}">
-        <p14:creationId xmlns:p14="http://schemas.microsoft.com/office/powerpoint/2010/main" val="3564462670"/>
+        <p14:creationId xmlns:p14="http://schemas.microsoft.com/office/powerpoint/2010/main" val="2522855523"/>
       </p:ext>
     </p:extLst>
   </p:cSld>
@@ -798,7 +798,7 @@
     </p:spTree>
     <p:extLst>
       <p:ext uri="{BB962C8B-B14F-4D97-AF65-F5344CB8AC3E}">
-        <p14:creationId xmlns:p14="http://schemas.microsoft.com/office/powerpoint/2010/main" val="1274655884"/>
+        <p14:creationId xmlns:p14="http://schemas.microsoft.com/office/powerpoint/2010/main" val="3564462670"/>
       </p:ext>
     </p:extLst>
   </p:cSld>
@@ -882,7 +882,7 @@
     </p:spTree>
     <p:extLst>
       <p:ext uri="{BB962C8B-B14F-4D97-AF65-F5344CB8AC3E}">
-        <p14:creationId xmlns:p14="http://schemas.microsoft.com/office/powerpoint/2010/main" val="1628633830"/>
+        <p14:creationId xmlns:p14="http://schemas.microsoft.com/office/powerpoint/2010/main" val="1274655884"/>
       </p:ext>
     </p:extLst>
   </p:cSld>
@@ -966,7 +966,7 @@
     </p:spTree>
     <p:extLst>
       <p:ext uri="{BB962C8B-B14F-4D97-AF65-F5344CB8AC3E}">
-        <p14:creationId xmlns:p14="http://schemas.microsoft.com/office/powerpoint/2010/main" val="3331821504"/>
+        <p14:creationId xmlns:p14="http://schemas.microsoft.com/office/powerpoint/2010/main" val="1628633830"/>
       </p:ext>
     </p:extLst>
   </p:cSld>
@@ -1050,7 +1050,7 @@
     </p:spTree>
     <p:extLst>
       <p:ext uri="{BB962C8B-B14F-4D97-AF65-F5344CB8AC3E}">
-        <p14:creationId xmlns:p14="http://schemas.microsoft.com/office/powerpoint/2010/main" val="1954429991"/>
+        <p14:creationId xmlns:p14="http://schemas.microsoft.com/office/powerpoint/2010/main" val="3331821504"/>
       </p:ext>
     </p:extLst>
   </p:cSld>
@@ -1134,7 +1134,7 @@
     </p:spTree>
     <p:extLst>
       <p:ext uri="{BB962C8B-B14F-4D97-AF65-F5344CB8AC3E}">
-        <p14:creationId xmlns:p14="http://schemas.microsoft.com/office/powerpoint/2010/main" val="2522855523"/>
+        <p14:creationId xmlns:p14="http://schemas.microsoft.com/office/powerpoint/2010/main" val="1954429991"/>
       </p:ext>
     </p:extLst>
   </p:cSld>
@@ -6757,10 +6757,136 @@
       </p:grpSpPr>
       <p:sp>
         <p:nvSpPr>
-          <p:cNvPr id="46" name="TextBox 45">
-            <a:extLst>
-              <a:ext uri="{FF2B5EF4-FFF2-40B4-BE49-F238E27FC236}">
-                <a16:creationId xmlns:a16="http://schemas.microsoft.com/office/drawing/2014/main" id="{2AAD1744-2773-8848-B485-4E4649EEF435}"/>
+          <p:cNvPr id="5" name="Rectangle 4">
+            <a:extLst>
+              <a:ext uri="{FF2B5EF4-FFF2-40B4-BE49-F238E27FC236}">
+                <a16:creationId xmlns:a16="http://schemas.microsoft.com/office/drawing/2014/main" id="{8EEB619A-2E50-4548-A2CE-28EBB2FA2C97}"/>
+              </a:ext>
+            </a:extLst>
+          </p:cNvPr>
+          <p:cNvSpPr/>
+          <p:nvPr/>
+        </p:nvSpPr>
+        <p:spPr>
+          <a:xfrm>
+            <a:off x="3504379" y="1173091"/>
+            <a:ext cx="6360058" cy="4511817"/>
+          </a:xfrm>
+          <a:prstGeom prst="rect">
+            <a:avLst/>
+          </a:prstGeom>
+          <a:solidFill>
+            <a:schemeClr val="bg1">
+              <a:lumMod val="95000"/>
+            </a:schemeClr>
+          </a:solidFill>
+          <a:ln w="19050">
+            <a:solidFill>
+              <a:srgbClr val="FFC000"/>
+            </a:solidFill>
+          </a:ln>
+        </p:spPr>
+        <p:style>
+          <a:lnRef idx="2">
+            <a:schemeClr val="accent1">
+              <a:shade val="50000"/>
+            </a:schemeClr>
+          </a:lnRef>
+          <a:fillRef idx="1">
+            <a:schemeClr val="accent1"/>
+          </a:fillRef>
+          <a:effectRef idx="0">
+            <a:schemeClr val="accent1"/>
+          </a:effectRef>
+          <a:fontRef idx="minor">
+            <a:schemeClr val="lt1"/>
+          </a:fontRef>
+        </p:style>
+        <p:txBody>
+          <a:bodyPr rtlCol="0" anchor="t" anchorCtr="0"/>
+          <a:lstStyle/>
+          <a:p>
+            <a:pPr algn="ctr"/>
+            <a:r>
+              <a:rPr lang="en-CH" sz="2400" b="1" dirty="0">
+                <a:solidFill>
+                  <a:srgbClr val="001489"/>
+                </a:solidFill>
+              </a:rPr>
+              <a:t>Webcrawler</a:t>
+            </a:r>
+          </a:p>
+        </p:txBody>
+      </p:sp>
+      <p:sp>
+        <p:nvSpPr>
+          <p:cNvPr id="28" name="Rectangle 27">
+            <a:extLst>
+              <a:ext uri="{FF2B5EF4-FFF2-40B4-BE49-F238E27FC236}">
+                <a16:creationId xmlns:a16="http://schemas.microsoft.com/office/drawing/2014/main" id="{972DF766-F29B-0D40-AE8A-D40E0619F337}"/>
+              </a:ext>
+            </a:extLst>
+          </p:cNvPr>
+          <p:cNvSpPr/>
+          <p:nvPr/>
+        </p:nvSpPr>
+        <p:spPr>
+          <a:xfrm>
+            <a:off x="7472293" y="2489195"/>
+            <a:ext cx="2290199" cy="1767120"/>
+          </a:xfrm>
+          <a:prstGeom prst="rect">
+            <a:avLst/>
+          </a:prstGeom>
+          <a:solidFill>
+            <a:schemeClr val="bg1">
+              <a:lumMod val="95000"/>
+            </a:schemeClr>
+          </a:solidFill>
+          <a:ln w="19050">
+            <a:solidFill>
+              <a:srgbClr val="FFC000"/>
+            </a:solidFill>
+          </a:ln>
+        </p:spPr>
+        <p:style>
+          <a:lnRef idx="2">
+            <a:schemeClr val="accent1">
+              <a:shade val="50000"/>
+            </a:schemeClr>
+          </a:lnRef>
+          <a:fillRef idx="1">
+            <a:schemeClr val="accent1"/>
+          </a:fillRef>
+          <a:effectRef idx="0">
+            <a:schemeClr val="accent1"/>
+          </a:effectRef>
+          <a:fontRef idx="minor">
+            <a:schemeClr val="lt1"/>
+          </a:fontRef>
+        </p:style>
+        <p:txBody>
+          <a:bodyPr rtlCol="0" anchor="t" anchorCtr="0"/>
+          <a:lstStyle/>
+          <a:p>
+            <a:pPr algn="ctr"/>
+            <a:r>
+              <a:rPr lang="en-CH" sz="2400" b="1" dirty="0">
+                <a:solidFill>
+                  <a:srgbClr val="001489"/>
+                </a:solidFill>
+              </a:rPr>
+              <a:t>Data</a:t>
+            </a:r>
+          </a:p>
+        </p:txBody>
+      </p:sp>
+      <p:sp>
+        <p:nvSpPr>
+          <p:cNvPr id="4" name="TextBox 3">
+            <a:extLst>
+              <a:ext uri="{FF2B5EF4-FFF2-40B4-BE49-F238E27FC236}">
+                <a16:creationId xmlns:a16="http://schemas.microsoft.com/office/drawing/2014/main" id="{F23154D0-7498-D84B-8F2A-722E099FDE85}"/>
               </a:ext>
             </a:extLst>
           </p:cNvPr>
@@ -6769,7 +6895,7 @@
         </p:nvSpPr>
         <p:spPr>
           <a:xfrm>
-            <a:off x="836059" y="631365"/>
+            <a:off x="836059" y="251222"/>
             <a:ext cx="10519882" cy="523220"/>
           </a:xfrm>
           <a:prstGeom prst="rect">
@@ -6783,21 +6909,1156 @@
           </a:bodyPr>
           <a:lstStyle/>
           <a:p>
+            <a:pPr algn="ctr"/>
             <a:r>
               <a:rPr lang="en-CH" sz="2800" b="1" dirty="0">
                 <a:solidFill>
                   <a:srgbClr val="001489"/>
                 </a:solidFill>
               </a:rPr>
-              <a:t>2. Artifacts</a:t>
-            </a:r>
-          </a:p>
-        </p:txBody>
-      </p:sp>
+              <a:t>Webcrawler workflow</a:t>
+            </a:r>
+          </a:p>
+        </p:txBody>
+      </p:sp>
+      <p:sp>
+        <p:nvSpPr>
+          <p:cNvPr id="6" name="Rounded Rectangle 5">
+            <a:extLst>
+              <a:ext uri="{FF2B5EF4-FFF2-40B4-BE49-F238E27FC236}">
+                <a16:creationId xmlns:a16="http://schemas.microsoft.com/office/drawing/2014/main" id="{F08EFB56-AE51-1A42-AC74-ED4073ED669D}"/>
+              </a:ext>
+            </a:extLst>
+          </p:cNvPr>
+          <p:cNvSpPr/>
+          <p:nvPr/>
+        </p:nvSpPr>
+        <p:spPr>
+          <a:xfrm>
+            <a:off x="4049038" y="1840934"/>
+            <a:ext cx="2042052" cy="944380"/>
+          </a:xfrm>
+          <a:prstGeom prst="roundRect">
+            <a:avLst/>
+          </a:prstGeom>
+          <a:solidFill>
+            <a:srgbClr val="001489"/>
+          </a:solidFill>
+        </p:spPr>
+        <p:style>
+          <a:lnRef idx="2">
+            <a:schemeClr val="accent1">
+              <a:shade val="50000"/>
+            </a:schemeClr>
+          </a:lnRef>
+          <a:fillRef idx="1">
+            <a:schemeClr val="accent1"/>
+          </a:fillRef>
+          <a:effectRef idx="0">
+            <a:schemeClr val="accent1"/>
+          </a:effectRef>
+          <a:fontRef idx="minor">
+            <a:schemeClr val="lt1"/>
+          </a:fontRef>
+        </p:style>
+        <p:txBody>
+          <a:bodyPr rtlCol="0" anchor="ctr"/>
+          <a:lstStyle/>
+          <a:p>
+            <a:pPr algn="r"/>
+            <a:r>
+              <a:rPr lang="de-CH" b="1" dirty="0" err="1"/>
+              <a:t>main</a:t>
+            </a:r>
+            <a:endParaRPr lang="de-CH" b="1" dirty="0"/>
+          </a:p>
+          <a:p>
+            <a:pPr algn="r"/>
+            <a:r>
+              <a:rPr lang="de-CH" b="1" dirty="0" err="1"/>
+              <a:t>page</a:t>
+            </a:r>
+            <a:endParaRPr lang="de-CH" b="1" dirty="0"/>
+          </a:p>
+          <a:p>
+            <a:pPr algn="r"/>
+            <a:r>
+              <a:rPr lang="de-CH" b="1" dirty="0" err="1"/>
+              <a:t>request</a:t>
+            </a:r>
+            <a:endParaRPr lang="en-CH" b="1" dirty="0"/>
+          </a:p>
+        </p:txBody>
+      </p:sp>
+      <p:pic>
+        <p:nvPicPr>
+          <p:cNvPr id="16" name="Graphic 15" descr="Web design with solid fill">
+            <a:extLst>
+              <a:ext uri="{FF2B5EF4-FFF2-40B4-BE49-F238E27FC236}">
+                <a16:creationId xmlns:a16="http://schemas.microsoft.com/office/drawing/2014/main" id="{C04913EF-8550-6044-AB1A-7E3E6561CC96}"/>
+              </a:ext>
+            </a:extLst>
+          </p:cNvPr>
+          <p:cNvPicPr>
+            <a:picLocks noChangeAspect="1"/>
+          </p:cNvPicPr>
+          <p:nvPr/>
+        </p:nvPicPr>
+        <p:blipFill>
+          <a:blip r:embed="rId3">
+            <a:extLst>
+              <a:ext uri="{96DAC541-7B7A-43D3-8B79-37D633B846F1}">
+                <asvg:svgBlip xmlns:asvg="http://schemas.microsoft.com/office/drawing/2016/SVG/main" r:embed="rId4"/>
+              </a:ext>
+            </a:extLst>
+          </a:blip>
+          <a:stretch>
+            <a:fillRect/>
+          </a:stretch>
+        </p:blipFill>
+        <p:spPr>
+          <a:xfrm>
+            <a:off x="4296464" y="1964011"/>
+            <a:ext cx="698225" cy="698225"/>
+          </a:xfrm>
+          <a:prstGeom prst="rect">
+            <a:avLst/>
+          </a:prstGeom>
+        </p:spPr>
+      </p:pic>
+      <p:sp>
+        <p:nvSpPr>
+          <p:cNvPr id="19" name="TextBox 18">
+            <a:extLst>
+              <a:ext uri="{FF2B5EF4-FFF2-40B4-BE49-F238E27FC236}">
+                <a16:creationId xmlns:a16="http://schemas.microsoft.com/office/drawing/2014/main" id="{04DB348A-CD60-4D4D-A221-F38987EB70A2}"/>
+              </a:ext>
+            </a:extLst>
+          </p:cNvPr>
+          <p:cNvSpPr txBox="1"/>
+          <p:nvPr/>
+        </p:nvSpPr>
+        <p:spPr>
+          <a:xfrm>
+            <a:off x="1597877" y="2489194"/>
+            <a:ext cx="1854542" cy="523220"/>
+          </a:xfrm>
+          <a:prstGeom prst="rect">
+            <a:avLst/>
+          </a:prstGeom>
+          <a:noFill/>
+        </p:spPr>
+        <p:txBody>
+          <a:bodyPr wrap="square" rtlCol="0">
+            <a:spAutoFit/>
+          </a:bodyPr>
+          <a:lstStyle/>
+          <a:p>
+            <a:pPr algn="ctr"/>
+            <a:r>
+              <a:rPr lang="en-GB" sz="1400" dirty="0">
+                <a:solidFill>
+                  <a:srgbClr val="001489"/>
+                </a:solidFill>
+              </a:rPr>
+              <a:t>https://</a:t>
+            </a:r>
+            <a:r>
+              <a:rPr lang="en-GB" sz="1400" dirty="0" err="1">
+                <a:solidFill>
+                  <a:srgbClr val="001489"/>
+                </a:solidFill>
+              </a:rPr>
+              <a:t>finance.yahoo.com</a:t>
+            </a:r>
+            <a:r>
+              <a:rPr lang="en-GB" sz="1400" dirty="0">
+                <a:solidFill>
+                  <a:srgbClr val="001489"/>
+                </a:solidFill>
+              </a:rPr>
+              <a:t>/cryptocurrencies/</a:t>
+            </a:r>
+            <a:endParaRPr lang="en-CH" sz="1400" dirty="0">
+              <a:solidFill>
+                <a:srgbClr val="001489"/>
+              </a:solidFill>
+            </a:endParaRPr>
+          </a:p>
+        </p:txBody>
+      </p:sp>
+      <p:cxnSp>
+        <p:nvCxnSpPr>
+          <p:cNvPr id="146" name="Straight Arrow Connector 145">
+            <a:extLst>
+              <a:ext uri="{FF2B5EF4-FFF2-40B4-BE49-F238E27FC236}">
+                <a16:creationId xmlns:a16="http://schemas.microsoft.com/office/drawing/2014/main" id="{34D4C463-F2F3-FD40-9096-39AA35262DE7}"/>
+              </a:ext>
+            </a:extLst>
+          </p:cNvPr>
+          <p:cNvCxnSpPr>
+            <a:cxnSpLocks/>
+            <a:stCxn id="6" idx="1"/>
+          </p:cNvCxnSpPr>
+          <p:nvPr/>
+        </p:nvCxnSpPr>
+        <p:spPr>
+          <a:xfrm flipH="1">
+            <a:off x="2892907" y="2313124"/>
+            <a:ext cx="1156131" cy="0"/>
+          </a:xfrm>
+          <a:prstGeom prst="straightConnector1">
+            <a:avLst/>
+          </a:prstGeom>
+          <a:ln w="76200">
+            <a:solidFill>
+              <a:schemeClr val="accent5">
+                <a:lumMod val="60000"/>
+                <a:lumOff val="40000"/>
+              </a:schemeClr>
+            </a:solidFill>
+            <a:headEnd type="triangle" w="med" len="med"/>
+            <a:tailEnd type="triangle" w="med" len="med"/>
+          </a:ln>
+        </p:spPr>
+        <p:style>
+          <a:lnRef idx="1">
+            <a:schemeClr val="accent1"/>
+          </a:lnRef>
+          <a:fillRef idx="0">
+            <a:schemeClr val="accent1"/>
+          </a:fillRef>
+          <a:effectRef idx="0">
+            <a:schemeClr val="accent1"/>
+          </a:effectRef>
+          <a:fontRef idx="minor">
+            <a:schemeClr val="tx1"/>
+          </a:fontRef>
+        </p:style>
+      </p:cxnSp>
+      <p:sp>
+        <p:nvSpPr>
+          <p:cNvPr id="47" name="Rounded Rectangle 46">
+            <a:extLst>
+              <a:ext uri="{FF2B5EF4-FFF2-40B4-BE49-F238E27FC236}">
+                <a16:creationId xmlns:a16="http://schemas.microsoft.com/office/drawing/2014/main" id="{54D906A1-21CF-8946-9426-E527582821EB}"/>
+              </a:ext>
+            </a:extLst>
+          </p:cNvPr>
+          <p:cNvSpPr/>
+          <p:nvPr/>
+        </p:nvSpPr>
+        <p:spPr>
+          <a:xfrm>
+            <a:off x="4061917" y="3108310"/>
+            <a:ext cx="2042052" cy="944380"/>
+          </a:xfrm>
+          <a:prstGeom prst="roundRect">
+            <a:avLst/>
+          </a:prstGeom>
+          <a:solidFill>
+            <a:srgbClr val="001489"/>
+          </a:solidFill>
+        </p:spPr>
+        <p:style>
+          <a:lnRef idx="2">
+            <a:schemeClr val="accent1">
+              <a:shade val="50000"/>
+            </a:schemeClr>
+          </a:lnRef>
+          <a:fillRef idx="1">
+            <a:schemeClr val="accent1"/>
+          </a:fillRef>
+          <a:effectRef idx="0">
+            <a:schemeClr val="accent1"/>
+          </a:effectRef>
+          <a:fontRef idx="minor">
+            <a:schemeClr val="lt1"/>
+          </a:fontRef>
+        </p:style>
+        <p:txBody>
+          <a:bodyPr rtlCol="0" anchor="ctr"/>
+          <a:lstStyle/>
+          <a:p>
+            <a:pPr algn="r"/>
+            <a:r>
+              <a:rPr lang="de-CH" b="1" dirty="0"/>
+              <a:t>parse</a:t>
+            </a:r>
+          </a:p>
+          <a:p>
+            <a:pPr algn="r"/>
+            <a:r>
+              <a:rPr lang="de-CH" b="1" dirty="0" err="1"/>
+              <a:t>article</a:t>
+            </a:r>
+            <a:endParaRPr lang="de-CH" b="1" dirty="0"/>
+          </a:p>
+          <a:p>
+            <a:pPr algn="r"/>
+            <a:r>
+              <a:rPr lang="de-CH" b="1" dirty="0" err="1"/>
+              <a:t>urls</a:t>
+            </a:r>
+            <a:r>
+              <a:rPr lang="de-CH" b="1" dirty="0"/>
+              <a:t> (</a:t>
+            </a:r>
+            <a:r>
+              <a:rPr lang="de-CH" b="1" dirty="0" err="1"/>
+              <a:t>href</a:t>
+            </a:r>
+            <a:r>
+              <a:rPr lang="de-CH" b="1" dirty="0"/>
+              <a:t>)</a:t>
+            </a:r>
+            <a:endParaRPr lang="en-CH" b="1" dirty="0"/>
+          </a:p>
+        </p:txBody>
+      </p:sp>
+      <p:pic>
+        <p:nvPicPr>
+          <p:cNvPr id="12" name="Graphic 11" descr="Magnifying glass with solid fill">
+            <a:extLst>
+              <a:ext uri="{FF2B5EF4-FFF2-40B4-BE49-F238E27FC236}">
+                <a16:creationId xmlns:a16="http://schemas.microsoft.com/office/drawing/2014/main" id="{0003CB08-8DB6-DF40-BC93-8D5909B78794}"/>
+              </a:ext>
+            </a:extLst>
+          </p:cNvPr>
+          <p:cNvPicPr>
+            <a:picLocks noChangeAspect="1"/>
+          </p:cNvPicPr>
+          <p:nvPr/>
+        </p:nvPicPr>
+        <p:blipFill>
+          <a:blip r:embed="rId5">
+            <a:extLst>
+              <a:ext uri="{96DAC541-7B7A-43D3-8B79-37D633B846F1}">
+                <asvg:svgBlip xmlns:asvg="http://schemas.microsoft.com/office/drawing/2016/SVG/main" r:embed="rId6"/>
+              </a:ext>
+            </a:extLst>
+          </a:blip>
+          <a:stretch>
+            <a:fillRect/>
+          </a:stretch>
+        </p:blipFill>
+        <p:spPr>
+          <a:xfrm>
+            <a:off x="4080289" y="3108310"/>
+            <a:ext cx="914400" cy="914400"/>
+          </a:xfrm>
+          <a:prstGeom prst="rect">
+            <a:avLst/>
+          </a:prstGeom>
+        </p:spPr>
+      </p:pic>
+      <p:cxnSp>
+        <p:nvCxnSpPr>
+          <p:cNvPr id="51" name="Straight Arrow Connector 50">
+            <a:extLst>
+              <a:ext uri="{FF2B5EF4-FFF2-40B4-BE49-F238E27FC236}">
+                <a16:creationId xmlns:a16="http://schemas.microsoft.com/office/drawing/2014/main" id="{94EA0891-CC33-0742-9801-810E55CFA752}"/>
+              </a:ext>
+            </a:extLst>
+          </p:cNvPr>
+          <p:cNvCxnSpPr>
+            <a:cxnSpLocks/>
+            <a:stCxn id="6" idx="2"/>
+            <a:endCxn id="47" idx="0"/>
+          </p:cNvCxnSpPr>
+          <p:nvPr/>
+        </p:nvCxnSpPr>
+        <p:spPr>
+          <a:xfrm>
+            <a:off x="5070064" y="2785314"/>
+            <a:ext cx="12879" cy="322996"/>
+          </a:xfrm>
+          <a:prstGeom prst="straightConnector1">
+            <a:avLst/>
+          </a:prstGeom>
+          <a:ln w="76200">
+            <a:solidFill>
+              <a:schemeClr val="accent5">
+                <a:lumMod val="60000"/>
+                <a:lumOff val="40000"/>
+              </a:schemeClr>
+            </a:solidFill>
+            <a:tailEnd type="triangle"/>
+          </a:ln>
+        </p:spPr>
+        <p:style>
+          <a:lnRef idx="1">
+            <a:schemeClr val="accent1"/>
+          </a:lnRef>
+          <a:fillRef idx="0">
+            <a:schemeClr val="accent1"/>
+          </a:fillRef>
+          <a:effectRef idx="0">
+            <a:schemeClr val="accent1"/>
+          </a:effectRef>
+          <a:fontRef idx="minor">
+            <a:schemeClr val="tx1"/>
+          </a:fontRef>
+        </p:style>
+      </p:cxnSp>
+      <p:sp>
+        <p:nvSpPr>
+          <p:cNvPr id="54" name="Rounded Rectangle 53">
+            <a:extLst>
+              <a:ext uri="{FF2B5EF4-FFF2-40B4-BE49-F238E27FC236}">
+                <a16:creationId xmlns:a16="http://schemas.microsoft.com/office/drawing/2014/main" id="{A929B00C-C7CC-A048-B894-D9C3C1B2C914}"/>
+              </a:ext>
+            </a:extLst>
+          </p:cNvPr>
+          <p:cNvSpPr/>
+          <p:nvPr/>
+        </p:nvSpPr>
+        <p:spPr>
+          <a:xfrm>
+            <a:off x="4077168" y="4375687"/>
+            <a:ext cx="2042052" cy="944380"/>
+          </a:xfrm>
+          <a:prstGeom prst="roundRect">
+            <a:avLst/>
+          </a:prstGeom>
+          <a:solidFill>
+            <a:srgbClr val="001489"/>
+          </a:solidFill>
+        </p:spPr>
+        <p:style>
+          <a:lnRef idx="2">
+            <a:schemeClr val="accent1">
+              <a:shade val="50000"/>
+            </a:schemeClr>
+          </a:lnRef>
+          <a:fillRef idx="1">
+            <a:schemeClr val="accent1"/>
+          </a:fillRef>
+          <a:effectRef idx="0">
+            <a:schemeClr val="accent1"/>
+          </a:effectRef>
+          <a:fontRef idx="minor">
+            <a:schemeClr val="lt1"/>
+          </a:fontRef>
+        </p:style>
+        <p:txBody>
+          <a:bodyPr rtlCol="0" anchor="ctr"/>
+          <a:lstStyle/>
+          <a:p>
+            <a:pPr algn="r"/>
+            <a:r>
+              <a:rPr lang="de-CH" b="1" dirty="0" err="1"/>
+              <a:t>article</a:t>
+            </a:r>
+            <a:endParaRPr lang="de-CH" b="1" dirty="0"/>
+          </a:p>
+          <a:p>
+            <a:pPr algn="r"/>
+            <a:r>
+              <a:rPr lang="de-CH" b="1" dirty="0" err="1"/>
+              <a:t>pages</a:t>
+            </a:r>
+            <a:endParaRPr lang="de-CH" b="1" dirty="0"/>
+          </a:p>
+          <a:p>
+            <a:pPr algn="r"/>
+            <a:r>
+              <a:rPr lang="de-CH" b="1" dirty="0" err="1"/>
+              <a:t>requests</a:t>
+            </a:r>
+            <a:endParaRPr lang="en-CH" b="1" dirty="0"/>
+          </a:p>
+        </p:txBody>
+      </p:sp>
+      <p:pic>
+        <p:nvPicPr>
+          <p:cNvPr id="57" name="Graphic 56" descr="Web design with solid fill">
+            <a:extLst>
+              <a:ext uri="{FF2B5EF4-FFF2-40B4-BE49-F238E27FC236}">
+                <a16:creationId xmlns:a16="http://schemas.microsoft.com/office/drawing/2014/main" id="{B3D71BF8-B185-CE44-9C6E-E477EEEE4958}"/>
+              </a:ext>
+            </a:extLst>
+          </p:cNvPr>
+          <p:cNvPicPr>
+            <a:picLocks noChangeAspect="1"/>
+          </p:cNvPicPr>
+          <p:nvPr/>
+        </p:nvPicPr>
+        <p:blipFill>
+          <a:blip r:embed="rId3">
+            <a:extLst>
+              <a:ext uri="{96DAC541-7B7A-43D3-8B79-37D633B846F1}">
+                <asvg:svgBlip xmlns:asvg="http://schemas.microsoft.com/office/drawing/2016/SVG/main" r:embed="rId4"/>
+              </a:ext>
+            </a:extLst>
+          </a:blip>
+          <a:stretch>
+            <a:fillRect/>
+          </a:stretch>
+        </p:blipFill>
+        <p:spPr>
+          <a:xfrm>
+            <a:off x="4296464" y="4498764"/>
+            <a:ext cx="698225" cy="698225"/>
+          </a:xfrm>
+          <a:prstGeom prst="rect">
+            <a:avLst/>
+          </a:prstGeom>
+        </p:spPr>
+      </p:pic>
+      <p:sp>
+        <p:nvSpPr>
+          <p:cNvPr id="59" name="TextBox 58">
+            <a:extLst>
+              <a:ext uri="{FF2B5EF4-FFF2-40B4-BE49-F238E27FC236}">
+                <a16:creationId xmlns:a16="http://schemas.microsoft.com/office/drawing/2014/main" id="{47623EFA-DC4E-AB49-A10D-5103D9DE75DB}"/>
+              </a:ext>
+            </a:extLst>
+          </p:cNvPr>
+          <p:cNvSpPr txBox="1"/>
+          <p:nvPr/>
+        </p:nvSpPr>
+        <p:spPr>
+          <a:xfrm>
+            <a:off x="1649836" y="4775726"/>
+            <a:ext cx="1854542" cy="523220"/>
+          </a:xfrm>
+          <a:prstGeom prst="rect">
+            <a:avLst/>
+          </a:prstGeom>
+          <a:noFill/>
+        </p:spPr>
+        <p:txBody>
+          <a:bodyPr wrap="square" rtlCol="0">
+            <a:spAutoFit/>
+          </a:bodyPr>
+          <a:lstStyle/>
+          <a:p>
+            <a:pPr algn="ctr"/>
+            <a:r>
+              <a:rPr lang="en-GB" sz="1400" dirty="0">
+                <a:solidFill>
+                  <a:srgbClr val="001489"/>
+                </a:solidFill>
+              </a:rPr>
+              <a:t>https://</a:t>
+            </a:r>
+            <a:r>
+              <a:rPr lang="en-GB" sz="1400" dirty="0" err="1">
+                <a:solidFill>
+                  <a:srgbClr val="001489"/>
+                </a:solidFill>
+              </a:rPr>
+              <a:t>finance.yahoo.com</a:t>
+            </a:r>
+            <a:r>
+              <a:rPr lang="en-GB" sz="1400" dirty="0">
+                <a:solidFill>
+                  <a:srgbClr val="001489"/>
+                </a:solidFill>
+              </a:rPr>
+              <a:t>/.../</a:t>
+            </a:r>
+            <a:endParaRPr lang="en-CH" sz="1400" dirty="0">
+              <a:solidFill>
+                <a:srgbClr val="001489"/>
+              </a:solidFill>
+            </a:endParaRPr>
+          </a:p>
+        </p:txBody>
+      </p:sp>
+      <p:pic>
+        <p:nvPicPr>
+          <p:cNvPr id="68" name="Graphic 67" descr="Web design with solid fill">
+            <a:extLst>
+              <a:ext uri="{FF2B5EF4-FFF2-40B4-BE49-F238E27FC236}">
+                <a16:creationId xmlns:a16="http://schemas.microsoft.com/office/drawing/2014/main" id="{EDE23C28-871E-634A-8E05-FBE4A69D4254}"/>
+              </a:ext>
+            </a:extLst>
+          </p:cNvPr>
+          <p:cNvPicPr>
+            <a:picLocks noChangeAspect="1"/>
+          </p:cNvPicPr>
+          <p:nvPr/>
+        </p:nvPicPr>
+        <p:blipFill>
+          <a:blip r:embed="rId7">
+            <a:extLst>
+              <a:ext uri="{96DAC541-7B7A-43D3-8B79-37D633B846F1}">
+                <asvg:svgBlip xmlns:asvg="http://schemas.microsoft.com/office/drawing/2016/SVG/main" r:embed="rId8"/>
+              </a:ext>
+            </a:extLst>
+          </a:blip>
+          <a:stretch>
+            <a:fillRect/>
+          </a:stretch>
+        </p:blipFill>
+        <p:spPr>
+          <a:xfrm>
+            <a:off x="2151305" y="1964010"/>
+            <a:ext cx="698225" cy="698225"/>
+          </a:xfrm>
+          <a:prstGeom prst="rect">
+            <a:avLst/>
+          </a:prstGeom>
+        </p:spPr>
+      </p:pic>
+      <p:pic>
+        <p:nvPicPr>
+          <p:cNvPr id="69" name="Graphic 68" descr="Web design with solid fill">
+            <a:extLst>
+              <a:ext uri="{FF2B5EF4-FFF2-40B4-BE49-F238E27FC236}">
+                <a16:creationId xmlns:a16="http://schemas.microsoft.com/office/drawing/2014/main" id="{DCB4A7C6-AAAA-8A43-9CD2-87D62F787A22}"/>
+              </a:ext>
+            </a:extLst>
+          </p:cNvPr>
+          <p:cNvPicPr>
+            <a:picLocks noChangeAspect="1"/>
+          </p:cNvPicPr>
+          <p:nvPr/>
+        </p:nvPicPr>
+        <p:blipFill>
+          <a:blip r:embed="rId7">
+            <a:extLst>
+              <a:ext uri="{96DAC541-7B7A-43D3-8B79-37D633B846F1}">
+                <asvg:svgBlip xmlns:asvg="http://schemas.microsoft.com/office/drawing/2016/SVG/main" r:embed="rId8"/>
+              </a:ext>
+            </a:extLst>
+          </a:blip>
+          <a:stretch>
+            <a:fillRect/>
+          </a:stretch>
+        </p:blipFill>
+        <p:spPr>
+          <a:xfrm>
+            <a:off x="1737655" y="4434226"/>
+            <a:ext cx="413650" cy="413650"/>
+          </a:xfrm>
+          <a:prstGeom prst="rect">
+            <a:avLst/>
+          </a:prstGeom>
+        </p:spPr>
+      </p:pic>
+      <p:pic>
+        <p:nvPicPr>
+          <p:cNvPr id="70" name="Graphic 69" descr="Web design with solid fill">
+            <a:extLst>
+              <a:ext uri="{FF2B5EF4-FFF2-40B4-BE49-F238E27FC236}">
+                <a16:creationId xmlns:a16="http://schemas.microsoft.com/office/drawing/2014/main" id="{D6B4F652-DE3B-BE45-8A9D-3461E288C760}"/>
+              </a:ext>
+            </a:extLst>
+          </p:cNvPr>
+          <p:cNvPicPr>
+            <a:picLocks noChangeAspect="1"/>
+          </p:cNvPicPr>
+          <p:nvPr/>
+        </p:nvPicPr>
+        <p:blipFill>
+          <a:blip r:embed="rId7">
+            <a:extLst>
+              <a:ext uri="{96DAC541-7B7A-43D3-8B79-37D633B846F1}">
+                <asvg:svgBlip xmlns:asvg="http://schemas.microsoft.com/office/drawing/2016/SVG/main" r:embed="rId8"/>
+              </a:ext>
+            </a:extLst>
+          </a:blip>
+          <a:stretch>
+            <a:fillRect/>
+          </a:stretch>
+        </p:blipFill>
+        <p:spPr>
+          <a:xfrm>
+            <a:off x="2111498" y="4434226"/>
+            <a:ext cx="413650" cy="413650"/>
+          </a:xfrm>
+          <a:prstGeom prst="rect">
+            <a:avLst/>
+          </a:prstGeom>
+        </p:spPr>
+      </p:pic>
+      <p:pic>
+        <p:nvPicPr>
+          <p:cNvPr id="71" name="Graphic 70" descr="Web design with solid fill">
+            <a:extLst>
+              <a:ext uri="{FF2B5EF4-FFF2-40B4-BE49-F238E27FC236}">
+                <a16:creationId xmlns:a16="http://schemas.microsoft.com/office/drawing/2014/main" id="{8795E38F-3C9A-0545-9A51-0E14CE4E41D2}"/>
+              </a:ext>
+            </a:extLst>
+          </p:cNvPr>
+          <p:cNvPicPr>
+            <a:picLocks noChangeAspect="1"/>
+          </p:cNvPicPr>
+          <p:nvPr/>
+        </p:nvPicPr>
+        <p:blipFill>
+          <a:blip r:embed="rId7">
+            <a:extLst>
+              <a:ext uri="{96DAC541-7B7A-43D3-8B79-37D633B846F1}">
+                <asvg:svgBlip xmlns:asvg="http://schemas.microsoft.com/office/drawing/2016/SVG/main" r:embed="rId8"/>
+              </a:ext>
+            </a:extLst>
+          </a:blip>
+          <a:stretch>
+            <a:fillRect/>
+          </a:stretch>
+        </p:blipFill>
+        <p:spPr>
+          <a:xfrm>
+            <a:off x="2500417" y="4434226"/>
+            <a:ext cx="413650" cy="413650"/>
+          </a:xfrm>
+          <a:prstGeom prst="rect">
+            <a:avLst/>
+          </a:prstGeom>
+        </p:spPr>
+      </p:pic>
+      <p:pic>
+        <p:nvPicPr>
+          <p:cNvPr id="73" name="Graphic 72" descr="Web design with solid fill">
+            <a:extLst>
+              <a:ext uri="{FF2B5EF4-FFF2-40B4-BE49-F238E27FC236}">
+                <a16:creationId xmlns:a16="http://schemas.microsoft.com/office/drawing/2014/main" id="{F9782797-37C0-BB43-8231-D1ADDA8F746A}"/>
+              </a:ext>
+            </a:extLst>
+          </p:cNvPr>
+          <p:cNvPicPr>
+            <a:picLocks noChangeAspect="1"/>
+          </p:cNvPicPr>
+          <p:nvPr/>
+        </p:nvPicPr>
+        <p:blipFill>
+          <a:blip r:embed="rId7">
+            <a:extLst>
+              <a:ext uri="{96DAC541-7B7A-43D3-8B79-37D633B846F1}">
+                <asvg:svgBlip xmlns:asvg="http://schemas.microsoft.com/office/drawing/2016/SVG/main" r:embed="rId8"/>
+              </a:ext>
+            </a:extLst>
+          </a:blip>
+          <a:stretch>
+            <a:fillRect/>
+          </a:stretch>
+        </p:blipFill>
+        <p:spPr>
+          <a:xfrm>
+            <a:off x="2906613" y="4434226"/>
+            <a:ext cx="413650" cy="413650"/>
+          </a:xfrm>
+          <a:prstGeom prst="rect">
+            <a:avLst/>
+          </a:prstGeom>
+        </p:spPr>
+      </p:pic>
+      <p:cxnSp>
+        <p:nvCxnSpPr>
+          <p:cNvPr id="74" name="Straight Arrow Connector 73">
+            <a:extLst>
+              <a:ext uri="{FF2B5EF4-FFF2-40B4-BE49-F238E27FC236}">
+                <a16:creationId xmlns:a16="http://schemas.microsoft.com/office/drawing/2014/main" id="{913651D1-AE49-A046-B40E-9A5C8CCE5237}"/>
+              </a:ext>
+            </a:extLst>
+          </p:cNvPr>
+          <p:cNvCxnSpPr>
+            <a:cxnSpLocks/>
+          </p:cNvCxnSpPr>
+          <p:nvPr/>
+        </p:nvCxnSpPr>
+        <p:spPr>
+          <a:xfrm flipH="1" flipV="1">
+            <a:off x="3334657" y="4847876"/>
+            <a:ext cx="727260" cy="1"/>
+          </a:xfrm>
+          <a:prstGeom prst="straightConnector1">
+            <a:avLst/>
+          </a:prstGeom>
+          <a:ln w="76200">
+            <a:solidFill>
+              <a:schemeClr val="accent5">
+                <a:lumMod val="60000"/>
+                <a:lumOff val="40000"/>
+              </a:schemeClr>
+            </a:solidFill>
+            <a:headEnd type="triangle" w="med" len="med"/>
+            <a:tailEnd type="triangle" w="med" len="med"/>
+          </a:ln>
+        </p:spPr>
+        <p:style>
+          <a:lnRef idx="1">
+            <a:schemeClr val="accent1"/>
+          </a:lnRef>
+          <a:fillRef idx="0">
+            <a:schemeClr val="accent1"/>
+          </a:fillRef>
+          <a:effectRef idx="0">
+            <a:schemeClr val="accent1"/>
+          </a:effectRef>
+          <a:fontRef idx="minor">
+            <a:schemeClr val="tx1"/>
+          </a:fontRef>
+        </p:style>
+      </p:cxnSp>
+      <p:sp>
+        <p:nvSpPr>
+          <p:cNvPr id="21" name="Circular Arrow 20">
+            <a:extLst>
+              <a:ext uri="{FF2B5EF4-FFF2-40B4-BE49-F238E27FC236}">
+                <a16:creationId xmlns:a16="http://schemas.microsoft.com/office/drawing/2014/main" id="{CADF267B-AB7F-6742-96F8-EE77A5AB4CAA}"/>
+              </a:ext>
+            </a:extLst>
+          </p:cNvPr>
+          <p:cNvSpPr/>
+          <p:nvPr/>
+        </p:nvSpPr>
+        <p:spPr>
+          <a:xfrm rot="5072906">
+            <a:off x="5909129" y="2921280"/>
+            <a:ext cx="732825" cy="2404041"/>
+          </a:xfrm>
+          <a:prstGeom prst="circularArrow">
+            <a:avLst>
+              <a:gd name="adj1" fmla="val 22036"/>
+              <a:gd name="adj2" fmla="val 1142319"/>
+              <a:gd name="adj3" fmla="val 20850065"/>
+              <a:gd name="adj4" fmla="val 10800000"/>
+              <a:gd name="adj5" fmla="val 12500"/>
+            </a:avLst>
+          </a:prstGeom>
+          <a:ln w="76200">
+            <a:solidFill>
+              <a:schemeClr val="accent5">
+                <a:lumMod val="60000"/>
+                <a:lumOff val="40000"/>
+              </a:schemeClr>
+            </a:solidFill>
+            <a:tailEnd type="triangle"/>
+          </a:ln>
+        </p:spPr>
+        <p:style>
+          <a:lnRef idx="1">
+            <a:schemeClr val="accent1"/>
+          </a:lnRef>
+          <a:fillRef idx="0">
+            <a:schemeClr val="accent1"/>
+          </a:fillRef>
+          <a:effectRef idx="0">
+            <a:schemeClr val="accent1"/>
+          </a:effectRef>
+          <a:fontRef idx="minor">
+            <a:schemeClr val="tx1"/>
+          </a:fontRef>
+        </p:style>
+        <p:txBody>
+          <a:bodyPr rtlCol="0" anchor="ctr"/>
+          <a:lstStyle/>
+          <a:p>
+            <a:pPr algn="ctr"/>
+            <a:endParaRPr lang="en-CH">
+              <a:solidFill>
+                <a:schemeClr val="tx1"/>
+              </a:solidFill>
+            </a:endParaRPr>
+          </a:p>
+        </p:txBody>
+      </p:sp>
+      <p:cxnSp>
+        <p:nvCxnSpPr>
+          <p:cNvPr id="82" name="Straight Arrow Connector 81">
+            <a:extLst>
+              <a:ext uri="{FF2B5EF4-FFF2-40B4-BE49-F238E27FC236}">
+                <a16:creationId xmlns:a16="http://schemas.microsoft.com/office/drawing/2014/main" id="{CF347DA5-EE83-0645-A556-1708567CB81A}"/>
+              </a:ext>
+            </a:extLst>
+          </p:cNvPr>
+          <p:cNvCxnSpPr>
+            <a:cxnSpLocks/>
+            <a:stCxn id="54" idx="3"/>
+          </p:cNvCxnSpPr>
+          <p:nvPr/>
+        </p:nvCxnSpPr>
+        <p:spPr>
+          <a:xfrm flipV="1">
+            <a:off x="6119220" y="4847876"/>
+            <a:ext cx="1353073" cy="1"/>
+          </a:xfrm>
+          <a:prstGeom prst="straightConnector1">
+            <a:avLst/>
+          </a:prstGeom>
+          <a:ln w="76200">
+            <a:solidFill>
+              <a:schemeClr val="accent5">
+                <a:lumMod val="60000"/>
+                <a:lumOff val="40000"/>
+              </a:schemeClr>
+            </a:solidFill>
+            <a:tailEnd type="triangle"/>
+          </a:ln>
+        </p:spPr>
+        <p:style>
+          <a:lnRef idx="1">
+            <a:schemeClr val="accent1"/>
+          </a:lnRef>
+          <a:fillRef idx="0">
+            <a:schemeClr val="accent1"/>
+          </a:fillRef>
+          <a:effectRef idx="0">
+            <a:schemeClr val="accent1"/>
+          </a:effectRef>
+          <a:fontRef idx="minor">
+            <a:schemeClr val="tx1"/>
+          </a:fontRef>
+        </p:style>
+      </p:cxnSp>
+      <p:sp>
+        <p:nvSpPr>
+          <p:cNvPr id="84" name="Rounded Rectangle 83">
+            <a:extLst>
+              <a:ext uri="{FF2B5EF4-FFF2-40B4-BE49-F238E27FC236}">
+                <a16:creationId xmlns:a16="http://schemas.microsoft.com/office/drawing/2014/main" id="{CE53A25B-55DC-3B4B-8804-A3A9D5AC5F2F}"/>
+              </a:ext>
+            </a:extLst>
+          </p:cNvPr>
+          <p:cNvSpPr/>
+          <p:nvPr/>
+        </p:nvSpPr>
+        <p:spPr>
+          <a:xfrm>
+            <a:off x="7615767" y="4405667"/>
+            <a:ext cx="2042052" cy="944380"/>
+          </a:xfrm>
+          <a:prstGeom prst="roundRect">
+            <a:avLst/>
+          </a:prstGeom>
+          <a:solidFill>
+            <a:srgbClr val="001489"/>
+          </a:solidFill>
+        </p:spPr>
+        <p:style>
+          <a:lnRef idx="2">
+            <a:schemeClr val="accent1">
+              <a:shade val="50000"/>
+            </a:schemeClr>
+          </a:lnRef>
+          <a:fillRef idx="1">
+            <a:schemeClr val="accent1"/>
+          </a:fillRef>
+          <a:effectRef idx="0">
+            <a:schemeClr val="accent1"/>
+          </a:effectRef>
+          <a:fontRef idx="minor">
+            <a:schemeClr val="lt1"/>
+          </a:fontRef>
+        </p:style>
+        <p:txBody>
+          <a:bodyPr rtlCol="0" anchor="ctr"/>
+          <a:lstStyle/>
+          <a:p>
+            <a:pPr algn="r"/>
+            <a:r>
+              <a:rPr lang="de-CH" b="1" dirty="0"/>
+              <a:t>parse</a:t>
+            </a:r>
+          </a:p>
+          <a:p>
+            <a:pPr algn="r"/>
+            <a:r>
+              <a:rPr lang="de-CH" b="1" dirty="0"/>
+              <a:t>title, </a:t>
+            </a:r>
+            <a:r>
+              <a:rPr lang="de-CH" b="1" dirty="0" err="1"/>
+              <a:t>body</a:t>
+            </a:r>
+            <a:r>
+              <a:rPr lang="de-CH" b="1" dirty="0"/>
+              <a:t>,</a:t>
+            </a:r>
+          </a:p>
+          <a:p>
+            <a:pPr algn="r"/>
+            <a:r>
+              <a:rPr lang="de-CH" b="1" dirty="0" err="1"/>
+              <a:t>date</a:t>
+            </a:r>
+            <a:endParaRPr lang="en-CH" b="1" dirty="0"/>
+          </a:p>
+        </p:txBody>
+      </p:sp>
+      <p:pic>
+        <p:nvPicPr>
+          <p:cNvPr id="86" name="Graphic 85" descr="Magnifying glass with solid fill">
+            <a:extLst>
+              <a:ext uri="{FF2B5EF4-FFF2-40B4-BE49-F238E27FC236}">
+                <a16:creationId xmlns:a16="http://schemas.microsoft.com/office/drawing/2014/main" id="{F43728BF-DC6B-754B-8A29-E28CFDFD5C43}"/>
+              </a:ext>
+            </a:extLst>
+          </p:cNvPr>
+          <p:cNvPicPr>
+            <a:picLocks noChangeAspect="1"/>
+          </p:cNvPicPr>
+          <p:nvPr/>
+        </p:nvPicPr>
+        <p:blipFill>
+          <a:blip r:embed="rId5">
+            <a:extLst>
+              <a:ext uri="{96DAC541-7B7A-43D3-8B79-37D633B846F1}">
+                <asvg:svgBlip xmlns:asvg="http://schemas.microsoft.com/office/drawing/2016/SVG/main" r:embed="rId6"/>
+              </a:ext>
+            </a:extLst>
+          </a:blip>
+          <a:stretch>
+            <a:fillRect/>
+          </a:stretch>
+        </p:blipFill>
+        <p:spPr>
+          <a:xfrm>
+            <a:off x="7634139" y="4405667"/>
+            <a:ext cx="914400" cy="914400"/>
+          </a:xfrm>
+          <a:prstGeom prst="rect">
+            <a:avLst/>
+          </a:prstGeom>
+        </p:spPr>
+      </p:pic>
+      <p:sp>
+        <p:nvSpPr>
+          <p:cNvPr id="87" name="Rounded Rectangle 86">
+            <a:extLst>
+              <a:ext uri="{FF2B5EF4-FFF2-40B4-BE49-F238E27FC236}">
+                <a16:creationId xmlns:a16="http://schemas.microsoft.com/office/drawing/2014/main" id="{2E42D35D-16F8-B648-A3A8-FF1624ED79B0}"/>
+              </a:ext>
+            </a:extLst>
+          </p:cNvPr>
+          <p:cNvSpPr/>
+          <p:nvPr/>
+        </p:nvSpPr>
+        <p:spPr>
+          <a:xfrm>
+            <a:off x="7896560" y="3087665"/>
+            <a:ext cx="1303958" cy="985670"/>
+          </a:xfrm>
+          <a:prstGeom prst="roundRect">
+            <a:avLst/>
+          </a:prstGeom>
+          <a:solidFill>
+            <a:srgbClr val="001489"/>
+          </a:solidFill>
+        </p:spPr>
+        <p:style>
+          <a:lnRef idx="2">
+            <a:schemeClr val="accent1">
+              <a:shade val="50000"/>
+            </a:schemeClr>
+          </a:lnRef>
+          <a:fillRef idx="1">
+            <a:schemeClr val="accent1"/>
+          </a:fillRef>
+          <a:effectRef idx="0">
+            <a:schemeClr val="accent1"/>
+          </a:effectRef>
+          <a:fontRef idx="minor">
+            <a:schemeClr val="lt1"/>
+          </a:fontRef>
+        </p:style>
+        <p:txBody>
+          <a:bodyPr rtlCol="0" anchor="ctr"/>
+          <a:lstStyle/>
+          <a:p>
+            <a:pPr algn="r"/>
+            <a:r>
+              <a:rPr lang="de-CH" b="1" dirty="0" err="1"/>
+              <a:t>csv</a:t>
+            </a:r>
+            <a:endParaRPr lang="en-CH" b="1" dirty="0"/>
+          </a:p>
+        </p:txBody>
+      </p:sp>
+      <p:pic>
+        <p:nvPicPr>
+          <p:cNvPr id="27" name="Graphic 26" descr="Open folder outline">
+            <a:extLst>
+              <a:ext uri="{FF2B5EF4-FFF2-40B4-BE49-F238E27FC236}">
+                <a16:creationId xmlns:a16="http://schemas.microsoft.com/office/drawing/2014/main" id="{6D6E2C8D-F0C6-8949-B161-384833189FA6}"/>
+              </a:ext>
+            </a:extLst>
+          </p:cNvPr>
+          <p:cNvPicPr>
+            <a:picLocks noChangeAspect="1"/>
+          </p:cNvPicPr>
+          <p:nvPr/>
+        </p:nvPicPr>
+        <p:blipFill>
+          <a:blip r:embed="rId9">
+            <a:extLst>
+              <a:ext uri="{96DAC541-7B7A-43D3-8B79-37D633B846F1}">
+                <asvg:svgBlip xmlns:asvg="http://schemas.microsoft.com/office/drawing/2016/SVG/main" r:embed="rId10"/>
+              </a:ext>
+            </a:extLst>
+          </a:blip>
+          <a:stretch>
+            <a:fillRect/>
+          </a:stretch>
+        </p:blipFill>
+        <p:spPr>
+          <a:xfrm>
+            <a:off x="7948899" y="3214588"/>
+            <a:ext cx="759183" cy="759183"/>
+          </a:xfrm>
+          <a:prstGeom prst="rect">
+            <a:avLst/>
+          </a:prstGeom>
+        </p:spPr>
+      </p:pic>
+      <p:cxnSp>
+        <p:nvCxnSpPr>
+          <p:cNvPr id="90" name="Straight Arrow Connector 89">
+            <a:extLst>
+              <a:ext uri="{FF2B5EF4-FFF2-40B4-BE49-F238E27FC236}">
+                <a16:creationId xmlns:a16="http://schemas.microsoft.com/office/drawing/2014/main" id="{08C2B415-7AD6-084A-AC78-4EF299D04ED8}"/>
+              </a:ext>
+            </a:extLst>
+          </p:cNvPr>
+          <p:cNvCxnSpPr>
+            <a:cxnSpLocks/>
+            <a:stCxn id="84" idx="0"/>
+            <a:endCxn id="87" idx="2"/>
+          </p:cNvCxnSpPr>
+          <p:nvPr/>
+        </p:nvCxnSpPr>
+        <p:spPr>
+          <a:xfrm flipH="1" flipV="1">
+            <a:off x="8548539" y="4073335"/>
+            <a:ext cx="88254" cy="332332"/>
+          </a:xfrm>
+          <a:prstGeom prst="straightConnector1">
+            <a:avLst/>
+          </a:prstGeom>
+          <a:ln w="76200">
+            <a:solidFill>
+              <a:schemeClr val="accent5">
+                <a:lumMod val="60000"/>
+                <a:lumOff val="40000"/>
+              </a:schemeClr>
+            </a:solidFill>
+            <a:tailEnd type="triangle"/>
+          </a:ln>
+        </p:spPr>
+        <p:style>
+          <a:lnRef idx="1">
+            <a:schemeClr val="accent1"/>
+          </a:lnRef>
+          <a:fillRef idx="0">
+            <a:schemeClr val="accent1"/>
+          </a:fillRef>
+          <a:effectRef idx="0">
+            <a:schemeClr val="accent1"/>
+          </a:effectRef>
+          <a:fontRef idx="minor">
+            <a:schemeClr val="tx1"/>
+          </a:fontRef>
+        </p:style>
+      </p:cxnSp>
     </p:spTree>
     <p:extLst>
       <p:ext uri="{BB962C8B-B14F-4D97-AF65-F5344CB8AC3E}">
-        <p14:creationId xmlns:p14="http://schemas.microsoft.com/office/powerpoint/2010/main" val="3083410252"/>
+        <p14:creationId xmlns:p14="http://schemas.microsoft.com/office/powerpoint/2010/main" val="1190263384"/>
       </p:ext>
     </p:extLst>
   </p:cSld>
@@ -6858,17 +8119,191 @@
                   <a:srgbClr val="001489"/>
                 </a:solidFill>
               </a:rPr>
-              <a:t>3. Code Management - Branches</a:t>
-            </a:r>
+              <a:t>2. Requirements &amp; Artifacts</a:t>
+            </a:r>
+          </a:p>
+        </p:txBody>
+      </p:sp>
+      <p:sp>
+        <p:nvSpPr>
+          <p:cNvPr id="2" name="TextBox 1">
+            <a:extLst>
+              <a:ext uri="{FF2B5EF4-FFF2-40B4-BE49-F238E27FC236}">
+                <a16:creationId xmlns:a16="http://schemas.microsoft.com/office/drawing/2014/main" id="{361EF6B9-1F80-8247-9671-F78CD2BCF1D9}"/>
+              </a:ext>
+            </a:extLst>
+          </p:cNvPr>
+          <p:cNvSpPr txBox="1"/>
+          <p:nvPr/>
+        </p:nvSpPr>
+        <p:spPr>
+          <a:xfrm>
+            <a:off x="836059" y="1387011"/>
+            <a:ext cx="10742916" cy="4524315"/>
+          </a:xfrm>
+          <a:prstGeom prst="rect">
+            <a:avLst/>
+          </a:prstGeom>
+          <a:noFill/>
+        </p:spPr>
+        <p:txBody>
+          <a:bodyPr wrap="square" rtlCol="0">
+            <a:spAutoFit/>
+          </a:bodyPr>
+          <a:lstStyle/>
+          <a:p>
+            <a:r>
+              <a:rPr lang="en-CH" dirty="0"/>
+              <a:t>Requirements:</a:t>
+            </a:r>
+          </a:p>
+          <a:p>
+            <a:r>
+              <a:rPr lang="en-GB" dirty="0"/>
+              <a:t>- Git</a:t>
+            </a:r>
+          </a:p>
+          <a:p>
+            <a:r>
+              <a:rPr lang="en-GB" dirty="0"/>
+              <a:t>- Python 3.7</a:t>
+            </a:r>
+          </a:p>
+          <a:p>
+            <a:r>
+              <a:rPr lang="en-GB" dirty="0"/>
+              <a:t>- Any IDE supporting </a:t>
+            </a:r>
+            <a:r>
+              <a:rPr lang="en-GB" dirty="0" err="1"/>
+              <a:t>Jupyter</a:t>
+            </a:r>
+            <a:r>
+              <a:rPr lang="en-GB" dirty="0"/>
+              <a:t> Notebook files¨</a:t>
+            </a:r>
+          </a:p>
+          <a:p>
+            <a:r>
+              <a:rPr lang="en-GB" dirty="0"/>
+              <a:t>- Libraries and package downloads: See </a:t>
+            </a:r>
+            <a:r>
+              <a:rPr lang="en-GB" dirty="0" err="1"/>
+              <a:t>model_update.py</a:t>
+            </a:r>
+            <a:r>
+              <a:rPr lang="en-GB" dirty="0"/>
+              <a:t> / </a:t>
+            </a:r>
+            <a:r>
+              <a:rPr lang="en-GB" dirty="0" err="1"/>
+              <a:t>webcrawler.py</a:t>
+            </a:r>
+            <a:r>
+              <a:rPr lang="en-GB"/>
+              <a:t> (below)</a:t>
+            </a:r>
+            <a:endParaRPr lang="en-GB" dirty="0"/>
+          </a:p>
+          <a:p>
+            <a:endParaRPr lang="en-CH" dirty="0"/>
+          </a:p>
+          <a:p>
+            <a:r>
+              <a:rPr lang="en-CH" dirty="0"/>
+              <a:t>Instructions:</a:t>
+            </a:r>
+          </a:p>
+          <a:p>
+            <a:pPr marL="285750" indent="-285750">
+              <a:buFont typeface="Symbol" pitchFamily="2" charset="2"/>
+              <a:buChar char="Þ"/>
+            </a:pPr>
+            <a:r>
+              <a:rPr lang="en-GB" dirty="0"/>
+              <a:t>g</a:t>
+            </a:r>
+            <a:r>
+              <a:rPr lang="en-CH" dirty="0"/>
+              <a:t>it clone </a:t>
+            </a:r>
+            <a:r>
+              <a:rPr lang="en-GB" dirty="0">
+                <a:hlinkClick r:id="rId3"/>
+              </a:rPr>
+              <a:t>https://github.com/sachaschwab/NLP-Clustering.git</a:t>
+            </a:r>
+            <a:endParaRPr lang="en-GB" dirty="0"/>
+          </a:p>
+          <a:p>
+            <a:pPr marL="285750" indent="-285750">
+              <a:buFont typeface="Symbol" pitchFamily="2" charset="2"/>
+              <a:buChar char="Þ"/>
+            </a:pPr>
+            <a:r>
+              <a:rPr lang="en-GB" dirty="0"/>
+              <a:t>c</a:t>
+            </a:r>
+            <a:r>
+              <a:rPr lang="en-CH" dirty="0"/>
+              <a:t>opy folder “daily_jobs” and content to server</a:t>
+            </a:r>
+            <a:br>
+              <a:rPr lang="en-CH" dirty="0"/>
+            </a:br>
+            <a:endParaRPr lang="en-CH" dirty="0"/>
+          </a:p>
+          <a:p>
+            <a:pPr marL="285750" indent="-285750">
+              <a:buFont typeface="Symbol" pitchFamily="2" charset="2"/>
+              <a:buChar char="Þ"/>
+            </a:pPr>
+            <a:endParaRPr lang="en-CH" dirty="0"/>
+          </a:p>
+          <a:p>
+            <a:pPr marL="285750" indent="-285750">
+              <a:buFont typeface="Symbol" pitchFamily="2" charset="2"/>
+              <a:buChar char="Þ"/>
+            </a:pPr>
+            <a:endParaRPr lang="en-CH" dirty="0"/>
+          </a:p>
+          <a:p>
+            <a:endParaRPr lang="en-CH" dirty="0"/>
+          </a:p>
+          <a:p>
+            <a:pPr marL="285750" indent="-285750">
+              <a:buFont typeface="Symbol" pitchFamily="2" charset="2"/>
+              <a:buChar char="Þ"/>
+            </a:pPr>
+            <a:r>
+              <a:rPr lang="en-GB" dirty="0"/>
+              <a:t>c</a:t>
+            </a:r>
+            <a:r>
+              <a:rPr lang="en-CH" dirty="0"/>
+              <a:t>opy folder ’model’ to customer target drive / server</a:t>
+            </a:r>
+            <a:br>
+              <a:rPr lang="en-CH" dirty="0"/>
+            </a:br>
+            <a:endParaRPr lang="en-CH" dirty="0"/>
+          </a:p>
+          <a:p>
+            <a:pPr marL="285750" indent="-285750">
+              <a:buFont typeface="Symbol" pitchFamily="2" charset="2"/>
+              <a:buChar char="Þ"/>
+            </a:pPr>
+            <a:endParaRPr lang="en-CH" dirty="0"/>
           </a:p>
         </p:txBody>
       </p:sp>
       <p:pic>
         <p:nvPicPr>
-          <p:cNvPr id="2" name="Picture 1">
-            <a:extLst>
-              <a:ext uri="{FF2B5EF4-FFF2-40B4-BE49-F238E27FC236}">
-                <a16:creationId xmlns:a16="http://schemas.microsoft.com/office/drawing/2014/main" id="{9A312B3C-259B-1848-A2A7-4E89C2F55B4F}"/>
+          <p:cNvPr id="3" name="Picture 2">
+            <a:extLst>
+              <a:ext uri="{FF2B5EF4-FFF2-40B4-BE49-F238E27FC236}">
+                <a16:creationId xmlns:a16="http://schemas.microsoft.com/office/drawing/2014/main" id="{1A3F2583-62F9-974B-8013-81014CF3EFBF}"/>
               </a:ext>
             </a:extLst>
           </p:cNvPr>
@@ -6878,25 +8313,124 @@
           <p:nvPr/>
         </p:nvPicPr>
         <p:blipFill>
-          <a:blip r:embed="rId3"/>
+          <a:blip r:embed="rId4"/>
           <a:stretch>
             <a:fillRect/>
           </a:stretch>
         </p:blipFill>
         <p:spPr>
           <a:xfrm>
-            <a:off x="713984" y="1625998"/>
-            <a:ext cx="10519882" cy="3176293"/>
+            <a:off x="5870823" y="3510669"/>
+            <a:ext cx="2118812" cy="841055"/>
           </a:xfrm>
           <a:prstGeom prst="rect">
             <a:avLst/>
           </a:prstGeom>
         </p:spPr>
       </p:pic>
+      <p:pic>
+        <p:nvPicPr>
+          <p:cNvPr id="4" name="Picture 3">
+            <a:extLst>
+              <a:ext uri="{FF2B5EF4-FFF2-40B4-BE49-F238E27FC236}">
+                <a16:creationId xmlns:a16="http://schemas.microsoft.com/office/drawing/2014/main" id="{93603410-EE66-1346-9C9E-44B89084068B}"/>
+              </a:ext>
+            </a:extLst>
+          </p:cNvPr>
+          <p:cNvPicPr>
+            <a:picLocks noChangeAspect="1"/>
+          </p:cNvPicPr>
+          <p:nvPr/>
+        </p:nvPicPr>
+        <p:blipFill>
+          <a:blip r:embed="rId5"/>
+          <a:stretch>
+            <a:fillRect/>
+          </a:stretch>
+        </p:blipFill>
+        <p:spPr>
+          <a:xfrm>
+            <a:off x="6281789" y="4826242"/>
+            <a:ext cx="2419437" cy="415841"/>
+          </a:xfrm>
+          <a:prstGeom prst="rect">
+            <a:avLst/>
+          </a:prstGeom>
+        </p:spPr>
+      </p:pic>
+      <p:sp>
+        <p:nvSpPr>
+          <p:cNvPr id="5" name="Rectangle 4">
+            <a:extLst>
+              <a:ext uri="{FF2B5EF4-FFF2-40B4-BE49-F238E27FC236}">
+                <a16:creationId xmlns:a16="http://schemas.microsoft.com/office/drawing/2014/main" id="{D9CC337F-3E6E-F64D-BB2B-FBFF7168D198}"/>
+              </a:ext>
+            </a:extLst>
+          </p:cNvPr>
+          <p:cNvSpPr/>
+          <p:nvPr/>
+        </p:nvSpPr>
+        <p:spPr>
+          <a:xfrm>
+            <a:off x="8085526" y="3469531"/>
+            <a:ext cx="3270415" cy="923330"/>
+          </a:xfrm>
+          <a:prstGeom prst="rect">
+            <a:avLst/>
+          </a:prstGeom>
+          <a:ln>
+            <a:solidFill>
+              <a:schemeClr val="accent1"/>
+            </a:solidFill>
+          </a:ln>
+        </p:spPr>
+        <p:txBody>
+          <a:bodyPr wrap="square">
+            <a:spAutoFit/>
+          </a:bodyPr>
+          <a:lstStyle/>
+          <a:p>
+            <a:r>
+              <a:rPr lang="en-GB" b="1" dirty="0">
+                <a:solidFill>
+                  <a:srgbClr val="001489"/>
+                </a:solidFill>
+              </a:rPr>
+              <a:t>schedule for daily r</a:t>
+            </a:r>
+            <a:r>
+              <a:rPr lang="en-CH" b="1" dirty="0">
+                <a:solidFill>
+                  <a:srgbClr val="001489"/>
+                </a:solidFill>
+              </a:rPr>
+              <a:t>un </a:t>
+            </a:r>
+            <a:r>
+              <a:rPr lang="en-CH" dirty="0"/>
+              <a:t>: </a:t>
+            </a:r>
+            <a:br>
+              <a:rPr lang="en-CH" dirty="0"/>
+            </a:br>
+            <a:r>
+              <a:rPr lang="en-CH" dirty="0"/>
+              <a:t>&gt; python webcrawler.py</a:t>
+            </a:r>
+            <a:br>
+              <a:rPr lang="en-CH" dirty="0"/>
+            </a:br>
+            <a:r>
+              <a:rPr lang="en-CH" dirty="0"/>
+              <a:t>&gt; pythonmodel_update.py</a:t>
+            </a:r>
+          </a:p>
+        </p:txBody>
+      </p:sp>
     </p:spTree>
     <p:extLst>
       <p:ext uri="{BB962C8B-B14F-4D97-AF65-F5344CB8AC3E}">
-        <p14:creationId xmlns:p14="http://schemas.microsoft.com/office/powerpoint/2010/main" val="428679017"/>
+        <p14:creationId xmlns:p14="http://schemas.microsoft.com/office/powerpoint/2010/main" val="3083410252"/>
       </p:ext>
     </p:extLst>
   </p:cSld>
@@ -6957,17 +8491,17 @@
                   <a:srgbClr val="001489"/>
                 </a:solidFill>
               </a:rPr>
-              <a:t>3. Code Management - Commits</a:t>
+              <a:t>3. Code Management - Branches</a:t>
             </a:r>
           </a:p>
         </p:txBody>
       </p:sp>
       <p:pic>
         <p:nvPicPr>
-          <p:cNvPr id="3" name="Picture 2">
-            <a:extLst>
-              <a:ext uri="{FF2B5EF4-FFF2-40B4-BE49-F238E27FC236}">
-                <a16:creationId xmlns:a16="http://schemas.microsoft.com/office/drawing/2014/main" id="{1D62B642-3194-A64E-9994-6E8A3D55CC99}"/>
+          <p:cNvPr id="2" name="Picture 1">
+            <a:extLst>
+              <a:ext uri="{FF2B5EF4-FFF2-40B4-BE49-F238E27FC236}">
+                <a16:creationId xmlns:a16="http://schemas.microsoft.com/office/drawing/2014/main" id="{9A312B3C-259B-1848-A2A7-4E89C2F55B4F}"/>
               </a:ext>
             </a:extLst>
           </p:cNvPr>
@@ -6984,8 +8518,8 @@
         </p:blipFill>
         <p:spPr>
           <a:xfrm>
-            <a:off x="964504" y="1498799"/>
-            <a:ext cx="8943584" cy="4418992"/>
+            <a:off x="713984" y="1625998"/>
+            <a:ext cx="10519882" cy="3176293"/>
           </a:xfrm>
           <a:prstGeom prst="rect">
             <a:avLst/>
@@ -6995,7 +8529,7 @@
     </p:spTree>
     <p:extLst>
       <p:ext uri="{BB962C8B-B14F-4D97-AF65-F5344CB8AC3E}">
-        <p14:creationId xmlns:p14="http://schemas.microsoft.com/office/powerpoint/2010/main" val="2446774859"/>
+        <p14:creationId xmlns:p14="http://schemas.microsoft.com/office/powerpoint/2010/main" val="428679017"/>
       </p:ext>
     </p:extLst>
   </p:cSld>
@@ -7056,17 +8590,17 @@
                   <a:srgbClr val="001489"/>
                 </a:solidFill>
               </a:rPr>
-              <a:t>3. Code Management - Comments</a:t>
+              <a:t>3. Code Management - Commits</a:t>
             </a:r>
           </a:p>
         </p:txBody>
       </p:sp>
       <p:pic>
         <p:nvPicPr>
-          <p:cNvPr id="2" name="Picture 1">
-            <a:extLst>
-              <a:ext uri="{FF2B5EF4-FFF2-40B4-BE49-F238E27FC236}">
-                <a16:creationId xmlns:a16="http://schemas.microsoft.com/office/drawing/2014/main" id="{5F852B5A-12D5-0A4E-A280-C4A5099740AA}"/>
+          <p:cNvPr id="3" name="Picture 2">
+            <a:extLst>
+              <a:ext uri="{FF2B5EF4-FFF2-40B4-BE49-F238E27FC236}">
+                <a16:creationId xmlns:a16="http://schemas.microsoft.com/office/drawing/2014/main" id="{1D62B642-3194-A64E-9994-6E8A3D55CC99}"/>
               </a:ext>
             </a:extLst>
           </p:cNvPr>
@@ -7083,8 +8617,8 @@
         </p:blipFill>
         <p:spPr>
           <a:xfrm>
-            <a:off x="951891" y="1705574"/>
-            <a:ext cx="9306925" cy="4061965"/>
+            <a:off x="964504" y="1498799"/>
+            <a:ext cx="8943584" cy="4418992"/>
           </a:xfrm>
           <a:prstGeom prst="rect">
             <a:avLst/>
@@ -7094,7 +8628,7 @@
     </p:spTree>
     <p:extLst>
       <p:ext uri="{BB962C8B-B14F-4D97-AF65-F5344CB8AC3E}">
-        <p14:creationId xmlns:p14="http://schemas.microsoft.com/office/powerpoint/2010/main" val="1022965167"/>
+        <p14:creationId xmlns:p14="http://schemas.microsoft.com/office/powerpoint/2010/main" val="2446774859"/>
       </p:ext>
     </p:extLst>
   </p:cSld>
@@ -7155,168 +8689,45 @@
                   <a:srgbClr val="001489"/>
                 </a:solidFill>
               </a:rPr>
-              <a:t>4. Limitations Data</a:t>
-            </a:r>
-          </a:p>
-        </p:txBody>
-      </p:sp>
-      <p:sp>
-        <p:nvSpPr>
-          <p:cNvPr id="2" name="TextBox 1">
-            <a:extLst>
-              <a:ext uri="{FF2B5EF4-FFF2-40B4-BE49-F238E27FC236}">
-                <a16:creationId xmlns:a16="http://schemas.microsoft.com/office/drawing/2014/main" id="{F3AD5C68-4B36-B742-8836-99D64631BF61}"/>
-              </a:ext>
-            </a:extLst>
-          </p:cNvPr>
-          <p:cNvSpPr txBox="1"/>
+              <a:t>3. Code Management - Comments</a:t>
+            </a:r>
+          </a:p>
+        </p:txBody>
+      </p:sp>
+      <p:pic>
+        <p:nvPicPr>
+          <p:cNvPr id="2" name="Picture 1">
+            <a:extLst>
+              <a:ext uri="{FF2B5EF4-FFF2-40B4-BE49-F238E27FC236}">
+                <a16:creationId xmlns:a16="http://schemas.microsoft.com/office/drawing/2014/main" id="{5F852B5A-12D5-0A4E-A280-C4A5099740AA}"/>
+              </a:ext>
+            </a:extLst>
+          </p:cNvPr>
+          <p:cNvPicPr>
+            <a:picLocks noChangeAspect="1"/>
+          </p:cNvPicPr>
           <p:nvPr/>
-        </p:nvSpPr>
-        <p:spPr>
-          <a:xfrm>
-            <a:off x="945222" y="1510301"/>
-            <a:ext cx="10900881" cy="3970318"/>
+        </p:nvPicPr>
+        <p:blipFill>
+          <a:blip r:embed="rId3"/>
+          <a:stretch>
+            <a:fillRect/>
+          </a:stretch>
+        </p:blipFill>
+        <p:spPr>
+          <a:xfrm>
+            <a:off x="951891" y="1705574"/>
+            <a:ext cx="9306925" cy="4061965"/>
           </a:xfrm>
           <a:prstGeom prst="rect">
             <a:avLst/>
           </a:prstGeom>
-          <a:noFill/>
-        </p:spPr>
-        <p:txBody>
-          <a:bodyPr wrap="square" rtlCol="0">
-            <a:spAutoFit/>
-          </a:bodyPr>
-          <a:lstStyle/>
-          <a:p>
-            <a:pPr marL="285750" indent="-285750">
-              <a:buFont typeface="Wingdings" pitchFamily="2" charset="2"/>
-              <a:buChar char="ü"/>
-            </a:pPr>
-            <a:r>
-              <a:rPr lang="en-CH" b="1" dirty="0"/>
-              <a:t>Harversted data</a:t>
-            </a:r>
-            <a:r>
-              <a:rPr lang="en-CH" dirty="0"/>
-              <a:t> (1.2MB) and </a:t>
-            </a:r>
-            <a:r>
-              <a:rPr lang="en-CH" b="1" dirty="0"/>
-              <a:t>model</a:t>
-            </a:r>
-            <a:r>
-              <a:rPr lang="en-CH" dirty="0"/>
-              <a:t> (291kB) are lightweigth: Scaling and requests should not produce any stretches mid-term</a:t>
-            </a:r>
-          </a:p>
-          <a:p>
-            <a:pPr marL="285750" indent="-285750">
-              <a:buFont typeface="Wingdings" pitchFamily="2" charset="2"/>
-              <a:buChar char="ü"/>
-            </a:pPr>
-            <a:endParaRPr lang="en-CH" dirty="0"/>
-          </a:p>
-          <a:p>
-            <a:pPr marL="285750" indent="-285750">
-              <a:buFont typeface="Wingdings" pitchFamily="2" charset="2"/>
-              <a:buChar char="Ø"/>
-            </a:pPr>
-            <a:r>
-              <a:rPr lang="en-CH" dirty="0"/>
-              <a:t>Consider however building an </a:t>
-            </a:r>
-            <a:r>
-              <a:rPr lang="en-CH" b="1" dirty="0"/>
-              <a:t>API</a:t>
-            </a:r>
-            <a:r>
-              <a:rPr lang="en-CH" dirty="0"/>
-              <a:t> in case the project takes off on user side (quant analysts, …)</a:t>
-            </a:r>
-          </a:p>
-          <a:p>
-            <a:pPr marL="285750" indent="-285750">
-              <a:buFont typeface="Wingdings" pitchFamily="2" charset="2"/>
-              <a:buChar char="ü"/>
-            </a:pPr>
-            <a:endParaRPr lang="en-CH" dirty="0"/>
-          </a:p>
-          <a:p>
-            <a:pPr marL="285750" indent="-285750">
-              <a:buFont typeface="Wingdings" pitchFamily="2" charset="2"/>
-              <a:buChar char="§"/>
-            </a:pPr>
-            <a:r>
-              <a:rPr lang="en-CH" dirty="0"/>
-              <a:t>Daily jobs: </a:t>
-            </a:r>
-          </a:p>
-          <a:p>
-            <a:pPr marL="285750" indent="-285750">
-              <a:buFont typeface="Wingdings" pitchFamily="2" charset="2"/>
-              <a:buChar char="§"/>
-            </a:pPr>
-            <a:endParaRPr lang="en-CH" dirty="0"/>
-          </a:p>
-          <a:p>
-            <a:pPr marL="742950" lvl="1" indent="-285750">
-              <a:buFont typeface="Wingdings" pitchFamily="2" charset="2"/>
-              <a:buChar char="Ø"/>
-            </a:pPr>
-            <a:r>
-              <a:rPr lang="en-CH" b="1" dirty="0"/>
-              <a:t>Webcrawler</a:t>
-            </a:r>
-            <a:r>
-              <a:rPr lang="en-CH" dirty="0"/>
-              <a:t>: Daily jobs access a limited amount of articles (20-50). Performance to be revisited as soon as additional websources are crawled.</a:t>
-            </a:r>
-          </a:p>
-          <a:p>
-            <a:pPr marL="742950" lvl="1" indent="-285750">
-              <a:buFont typeface="Wingdings" pitchFamily="2" charset="2"/>
-              <a:buChar char="Ø"/>
-            </a:pPr>
-            <a:endParaRPr lang="en-CH" dirty="0"/>
-          </a:p>
-          <a:p>
-            <a:pPr marL="742950" lvl="1" indent="-285750">
-              <a:buFont typeface="Wingdings" pitchFamily="2" charset="2"/>
-              <a:buChar char="Ø"/>
-            </a:pPr>
-            <a:r>
-              <a:rPr lang="en-CH" b="1" dirty="0"/>
-              <a:t>Model refresh (NLP tasks)</a:t>
-            </a:r>
-            <a:r>
-              <a:rPr lang="en-CH" dirty="0"/>
-              <a:t>: Code performance to be ameliorated during future releases (list comprehensions, unnecessary if’s and looops) </a:t>
-            </a:r>
-            <a:br>
-              <a:rPr lang="en-CH" dirty="0"/>
-            </a:br>
-            <a:r>
-              <a:rPr lang="en-CH" b="1" dirty="0"/>
-              <a:t>=&gt; Backlog:	</a:t>
-            </a:r>
-            <a:br>
-              <a:rPr lang="en-CH" b="1" dirty="0"/>
-            </a:br>
-            <a:r>
-              <a:rPr lang="en-CH" b="1" dirty="0"/>
-              <a:t>      </a:t>
-            </a:r>
-            <a:r>
-              <a:rPr lang="en-CH" dirty="0"/>
-              <a:t>- Named entities + keyword extraction performance</a:t>
-            </a:r>
-          </a:p>
-        </p:txBody>
-      </p:sp>
+        </p:spPr>
+      </p:pic>
     </p:spTree>
     <p:extLst>
       <p:ext uri="{BB962C8B-B14F-4D97-AF65-F5344CB8AC3E}">
-        <p14:creationId xmlns:p14="http://schemas.microsoft.com/office/powerpoint/2010/main" val="3476624544"/>
+        <p14:creationId xmlns:p14="http://schemas.microsoft.com/office/powerpoint/2010/main" val="1022965167"/>
       </p:ext>
     </p:extLst>
   </p:cSld>
@@ -7345,136 +8756,10 @@
       </p:grpSpPr>
       <p:sp>
         <p:nvSpPr>
-          <p:cNvPr id="5" name="Rectangle 4">
-            <a:extLst>
-              <a:ext uri="{FF2B5EF4-FFF2-40B4-BE49-F238E27FC236}">
-                <a16:creationId xmlns:a16="http://schemas.microsoft.com/office/drawing/2014/main" id="{8EEB619A-2E50-4548-A2CE-28EBB2FA2C97}"/>
-              </a:ext>
-            </a:extLst>
-          </p:cNvPr>
-          <p:cNvSpPr/>
-          <p:nvPr/>
-        </p:nvSpPr>
-        <p:spPr>
-          <a:xfrm>
-            <a:off x="3504379" y="1173091"/>
-            <a:ext cx="6360058" cy="4511817"/>
-          </a:xfrm>
-          <a:prstGeom prst="rect">
-            <a:avLst/>
-          </a:prstGeom>
-          <a:solidFill>
-            <a:schemeClr val="bg1">
-              <a:lumMod val="95000"/>
-            </a:schemeClr>
-          </a:solidFill>
-          <a:ln w="19050">
-            <a:solidFill>
-              <a:srgbClr val="FFC000"/>
-            </a:solidFill>
-          </a:ln>
-        </p:spPr>
-        <p:style>
-          <a:lnRef idx="2">
-            <a:schemeClr val="accent1">
-              <a:shade val="50000"/>
-            </a:schemeClr>
-          </a:lnRef>
-          <a:fillRef idx="1">
-            <a:schemeClr val="accent1"/>
-          </a:fillRef>
-          <a:effectRef idx="0">
-            <a:schemeClr val="accent1"/>
-          </a:effectRef>
-          <a:fontRef idx="minor">
-            <a:schemeClr val="lt1"/>
-          </a:fontRef>
-        </p:style>
-        <p:txBody>
-          <a:bodyPr rtlCol="0" anchor="t" anchorCtr="0"/>
-          <a:lstStyle/>
-          <a:p>
-            <a:pPr algn="ctr"/>
-            <a:r>
-              <a:rPr lang="en-CH" sz="2400" b="1" dirty="0">
-                <a:solidFill>
-                  <a:srgbClr val="001489"/>
-                </a:solidFill>
-              </a:rPr>
-              <a:t>Webcrawler</a:t>
-            </a:r>
-          </a:p>
-        </p:txBody>
-      </p:sp>
-      <p:sp>
-        <p:nvSpPr>
-          <p:cNvPr id="28" name="Rectangle 27">
-            <a:extLst>
-              <a:ext uri="{FF2B5EF4-FFF2-40B4-BE49-F238E27FC236}">
-                <a16:creationId xmlns:a16="http://schemas.microsoft.com/office/drawing/2014/main" id="{972DF766-F29B-0D40-AE8A-D40E0619F337}"/>
-              </a:ext>
-            </a:extLst>
-          </p:cNvPr>
-          <p:cNvSpPr/>
-          <p:nvPr/>
-        </p:nvSpPr>
-        <p:spPr>
-          <a:xfrm>
-            <a:off x="7472293" y="2489195"/>
-            <a:ext cx="2290199" cy="1767120"/>
-          </a:xfrm>
-          <a:prstGeom prst="rect">
-            <a:avLst/>
-          </a:prstGeom>
-          <a:solidFill>
-            <a:schemeClr val="bg1">
-              <a:lumMod val="95000"/>
-            </a:schemeClr>
-          </a:solidFill>
-          <a:ln w="19050">
-            <a:solidFill>
-              <a:srgbClr val="FFC000"/>
-            </a:solidFill>
-          </a:ln>
-        </p:spPr>
-        <p:style>
-          <a:lnRef idx="2">
-            <a:schemeClr val="accent1">
-              <a:shade val="50000"/>
-            </a:schemeClr>
-          </a:lnRef>
-          <a:fillRef idx="1">
-            <a:schemeClr val="accent1"/>
-          </a:fillRef>
-          <a:effectRef idx="0">
-            <a:schemeClr val="accent1"/>
-          </a:effectRef>
-          <a:fontRef idx="minor">
-            <a:schemeClr val="lt1"/>
-          </a:fontRef>
-        </p:style>
-        <p:txBody>
-          <a:bodyPr rtlCol="0" anchor="t" anchorCtr="0"/>
-          <a:lstStyle/>
-          <a:p>
-            <a:pPr algn="ctr"/>
-            <a:r>
-              <a:rPr lang="en-CH" sz="2400" b="1" dirty="0">
-                <a:solidFill>
-                  <a:srgbClr val="001489"/>
-                </a:solidFill>
-              </a:rPr>
-              <a:t>Data</a:t>
-            </a:r>
-          </a:p>
-        </p:txBody>
-      </p:sp>
-      <p:sp>
-        <p:nvSpPr>
-          <p:cNvPr id="4" name="TextBox 3">
-            <a:extLst>
-              <a:ext uri="{FF2B5EF4-FFF2-40B4-BE49-F238E27FC236}">
-                <a16:creationId xmlns:a16="http://schemas.microsoft.com/office/drawing/2014/main" id="{F23154D0-7498-D84B-8F2A-722E099FDE85}"/>
+          <p:cNvPr id="46" name="TextBox 45">
+            <a:extLst>
+              <a:ext uri="{FF2B5EF4-FFF2-40B4-BE49-F238E27FC236}">
+                <a16:creationId xmlns:a16="http://schemas.microsoft.com/office/drawing/2014/main" id="{2AAD1744-2773-8848-B485-4E4649EEF435}"/>
               </a:ext>
             </a:extLst>
           </p:cNvPr>
@@ -7483,7 +8768,7 @@
         </p:nvSpPr>
         <p:spPr>
           <a:xfrm>
-            <a:off x="836059" y="251222"/>
+            <a:off x="836059" y="631365"/>
             <a:ext cx="10519882" cy="523220"/>
           </a:xfrm>
           <a:prstGeom prst="rect">
@@ -7497,129 +8782,23 @@
           </a:bodyPr>
           <a:lstStyle/>
           <a:p>
-            <a:pPr algn="ctr"/>
             <a:r>
               <a:rPr lang="en-CH" sz="2800" b="1" dirty="0">
                 <a:solidFill>
                   <a:srgbClr val="001489"/>
                 </a:solidFill>
               </a:rPr>
-              <a:t>Webcrawler workflow</a:t>
-            </a:r>
-          </a:p>
-        </p:txBody>
-      </p:sp>
-      <p:sp>
-        <p:nvSpPr>
-          <p:cNvPr id="6" name="Rounded Rectangle 5">
-            <a:extLst>
-              <a:ext uri="{FF2B5EF4-FFF2-40B4-BE49-F238E27FC236}">
-                <a16:creationId xmlns:a16="http://schemas.microsoft.com/office/drawing/2014/main" id="{F08EFB56-AE51-1A42-AC74-ED4073ED669D}"/>
-              </a:ext>
-            </a:extLst>
-          </p:cNvPr>
-          <p:cNvSpPr/>
-          <p:nvPr/>
-        </p:nvSpPr>
-        <p:spPr>
-          <a:xfrm>
-            <a:off x="4049038" y="1840934"/>
-            <a:ext cx="2042052" cy="944380"/>
-          </a:xfrm>
-          <a:prstGeom prst="roundRect">
-            <a:avLst/>
-          </a:prstGeom>
-          <a:solidFill>
-            <a:srgbClr val="001489"/>
-          </a:solidFill>
-        </p:spPr>
-        <p:style>
-          <a:lnRef idx="2">
-            <a:schemeClr val="accent1">
-              <a:shade val="50000"/>
-            </a:schemeClr>
-          </a:lnRef>
-          <a:fillRef idx="1">
-            <a:schemeClr val="accent1"/>
-          </a:fillRef>
-          <a:effectRef idx="0">
-            <a:schemeClr val="accent1"/>
-          </a:effectRef>
-          <a:fontRef idx="minor">
-            <a:schemeClr val="lt1"/>
-          </a:fontRef>
-        </p:style>
-        <p:txBody>
-          <a:bodyPr rtlCol="0" anchor="ctr"/>
-          <a:lstStyle/>
-          <a:p>
-            <a:pPr algn="r"/>
-            <a:r>
-              <a:rPr lang="de-CH" b="1" dirty="0" err="1"/>
-              <a:t>main</a:t>
-            </a:r>
-            <a:endParaRPr lang="de-CH" b="1" dirty="0"/>
-          </a:p>
-          <a:p>
-            <a:pPr algn="r"/>
-            <a:r>
-              <a:rPr lang="de-CH" b="1" dirty="0" err="1"/>
-              <a:t>page</a:t>
-            </a:r>
-            <a:endParaRPr lang="de-CH" b="1" dirty="0"/>
-          </a:p>
-          <a:p>
-            <a:pPr algn="r"/>
-            <a:r>
-              <a:rPr lang="de-CH" b="1" dirty="0" err="1"/>
-              <a:t>request</a:t>
-            </a:r>
-            <a:endParaRPr lang="en-CH" b="1" dirty="0"/>
-          </a:p>
-        </p:txBody>
-      </p:sp>
-      <p:pic>
-        <p:nvPicPr>
-          <p:cNvPr id="16" name="Graphic 15" descr="Web design with solid fill">
-            <a:extLst>
-              <a:ext uri="{FF2B5EF4-FFF2-40B4-BE49-F238E27FC236}">
-                <a16:creationId xmlns:a16="http://schemas.microsoft.com/office/drawing/2014/main" id="{C04913EF-8550-6044-AB1A-7E3E6561CC96}"/>
-              </a:ext>
-            </a:extLst>
-          </p:cNvPr>
-          <p:cNvPicPr>
-            <a:picLocks noChangeAspect="1"/>
-          </p:cNvPicPr>
-          <p:nvPr/>
-        </p:nvPicPr>
-        <p:blipFill>
-          <a:blip r:embed="rId3">
-            <a:extLst>
-              <a:ext uri="{96DAC541-7B7A-43D3-8B79-37D633B846F1}">
-                <asvg:svgBlip xmlns:asvg="http://schemas.microsoft.com/office/drawing/2016/SVG/main" r:embed="rId4"/>
-              </a:ext>
-            </a:extLst>
-          </a:blip>
-          <a:stretch>
-            <a:fillRect/>
-          </a:stretch>
-        </p:blipFill>
-        <p:spPr>
-          <a:xfrm>
-            <a:off x="4296464" y="1964011"/>
-            <a:ext cx="698225" cy="698225"/>
-          </a:xfrm>
-          <a:prstGeom prst="rect">
-            <a:avLst/>
-          </a:prstGeom>
-        </p:spPr>
-      </p:pic>
-      <p:sp>
-        <p:nvSpPr>
-          <p:cNvPr id="19" name="TextBox 18">
-            <a:extLst>
-              <a:ext uri="{FF2B5EF4-FFF2-40B4-BE49-F238E27FC236}">
-                <a16:creationId xmlns:a16="http://schemas.microsoft.com/office/drawing/2014/main" id="{04DB348A-CD60-4D4D-A221-F38987EB70A2}"/>
+              <a:t>4. Limitations Data</a:t>
+            </a:r>
+          </a:p>
+        </p:txBody>
+      </p:sp>
+      <p:sp>
+        <p:nvSpPr>
+          <p:cNvPr id="2" name="TextBox 1">
+            <a:extLst>
+              <a:ext uri="{FF2B5EF4-FFF2-40B4-BE49-F238E27FC236}">
+                <a16:creationId xmlns:a16="http://schemas.microsoft.com/office/drawing/2014/main" id="{F3AD5C68-4B36-B742-8836-99D64631BF61}"/>
               </a:ext>
             </a:extLst>
           </p:cNvPr>
@@ -7628,8 +8807,8 @@
         </p:nvSpPr>
         <p:spPr>
           <a:xfrm>
-            <a:off x="1597877" y="2489194"/>
-            <a:ext cx="1854542" cy="523220"/>
+            <a:off x="836059" y="1294544"/>
+            <a:ext cx="10900881" cy="5078313"/>
           </a:xfrm>
           <a:prstGeom prst="rect">
             <a:avLst/>
@@ -7642,1011 +8821,159 @@
           </a:bodyPr>
           <a:lstStyle/>
           <a:p>
-            <a:pPr algn="ctr"/>
-            <a:r>
-              <a:rPr lang="en-GB" sz="1400" dirty="0">
-                <a:solidFill>
-                  <a:srgbClr val="001489"/>
-                </a:solidFill>
-              </a:rPr>
-              <a:t>https://</a:t>
-            </a:r>
-            <a:r>
-              <a:rPr lang="en-GB" sz="1400" dirty="0" err="1">
-                <a:solidFill>
-                  <a:srgbClr val="001489"/>
-                </a:solidFill>
-              </a:rPr>
-              <a:t>finance.yahoo.com</a:t>
-            </a:r>
-            <a:r>
-              <a:rPr lang="en-GB" sz="1400" dirty="0">
-                <a:solidFill>
-                  <a:srgbClr val="001489"/>
-                </a:solidFill>
-              </a:rPr>
-              <a:t>/cryptocurrencies/</a:t>
-            </a:r>
-            <a:endParaRPr lang="en-CH" sz="1400" dirty="0">
-              <a:solidFill>
-                <a:srgbClr val="001489"/>
-              </a:solidFill>
-            </a:endParaRPr>
-          </a:p>
-        </p:txBody>
-      </p:sp>
-      <p:cxnSp>
-        <p:nvCxnSpPr>
-          <p:cNvPr id="146" name="Straight Arrow Connector 145">
-            <a:extLst>
-              <a:ext uri="{FF2B5EF4-FFF2-40B4-BE49-F238E27FC236}">
-                <a16:creationId xmlns:a16="http://schemas.microsoft.com/office/drawing/2014/main" id="{34D4C463-F2F3-FD40-9096-39AA35262DE7}"/>
-              </a:ext>
-            </a:extLst>
-          </p:cNvPr>
-          <p:cNvCxnSpPr>
-            <a:cxnSpLocks/>
-            <a:stCxn id="6" idx="1"/>
-          </p:cNvCxnSpPr>
-          <p:nvPr/>
-        </p:nvCxnSpPr>
-        <p:spPr>
-          <a:xfrm flipH="1">
-            <a:off x="2892907" y="2313124"/>
-            <a:ext cx="1156131" cy="0"/>
-          </a:xfrm>
-          <a:prstGeom prst="straightConnector1">
-            <a:avLst/>
-          </a:prstGeom>
-          <a:ln w="76200">
-            <a:solidFill>
-              <a:schemeClr val="accent5">
-                <a:lumMod val="60000"/>
-                <a:lumOff val="40000"/>
-              </a:schemeClr>
-            </a:solidFill>
-            <a:headEnd type="triangle" w="med" len="med"/>
-            <a:tailEnd type="triangle" w="med" len="med"/>
-          </a:ln>
-        </p:spPr>
-        <p:style>
-          <a:lnRef idx="1">
-            <a:schemeClr val="accent1"/>
-          </a:lnRef>
-          <a:fillRef idx="0">
-            <a:schemeClr val="accent1"/>
-          </a:fillRef>
-          <a:effectRef idx="0">
-            <a:schemeClr val="accent1"/>
-          </a:effectRef>
-          <a:fontRef idx="minor">
-            <a:schemeClr val="tx1"/>
-          </a:fontRef>
-        </p:style>
-      </p:cxnSp>
-      <p:sp>
-        <p:nvSpPr>
-          <p:cNvPr id="47" name="Rounded Rectangle 46">
-            <a:extLst>
-              <a:ext uri="{FF2B5EF4-FFF2-40B4-BE49-F238E27FC236}">
-                <a16:creationId xmlns:a16="http://schemas.microsoft.com/office/drawing/2014/main" id="{54D906A1-21CF-8946-9426-E527582821EB}"/>
-              </a:ext>
-            </a:extLst>
-          </p:cNvPr>
-          <p:cNvSpPr/>
-          <p:nvPr/>
-        </p:nvSpPr>
-        <p:spPr>
-          <a:xfrm>
-            <a:off x="4061917" y="3108310"/>
-            <a:ext cx="2042052" cy="944380"/>
-          </a:xfrm>
-          <a:prstGeom prst="roundRect">
-            <a:avLst/>
-          </a:prstGeom>
-          <a:solidFill>
-            <a:srgbClr val="001489"/>
-          </a:solidFill>
-        </p:spPr>
-        <p:style>
-          <a:lnRef idx="2">
-            <a:schemeClr val="accent1">
-              <a:shade val="50000"/>
-            </a:schemeClr>
-          </a:lnRef>
-          <a:fillRef idx="1">
-            <a:schemeClr val="accent1"/>
-          </a:fillRef>
-          <a:effectRef idx="0">
-            <a:schemeClr val="accent1"/>
-          </a:effectRef>
-          <a:fontRef idx="minor">
-            <a:schemeClr val="lt1"/>
-          </a:fontRef>
-        </p:style>
-        <p:txBody>
-          <a:bodyPr rtlCol="0" anchor="ctr"/>
-          <a:lstStyle/>
-          <a:p>
-            <a:pPr algn="r"/>
-            <a:r>
-              <a:rPr lang="de-CH" b="1" dirty="0"/>
-              <a:t>parse</a:t>
-            </a:r>
-          </a:p>
-          <a:p>
-            <a:pPr algn="r"/>
-            <a:r>
-              <a:rPr lang="de-CH" b="1" dirty="0" err="1"/>
-              <a:t>article</a:t>
-            </a:r>
-            <a:endParaRPr lang="de-CH" b="1" dirty="0"/>
-          </a:p>
-          <a:p>
-            <a:pPr algn="r"/>
-            <a:r>
-              <a:rPr lang="de-CH" b="1" dirty="0" err="1"/>
-              <a:t>urls</a:t>
-            </a:r>
-            <a:r>
-              <a:rPr lang="de-CH" b="1" dirty="0"/>
-              <a:t> (</a:t>
-            </a:r>
-            <a:r>
-              <a:rPr lang="de-CH" b="1" dirty="0" err="1"/>
-              <a:t>href</a:t>
-            </a:r>
-            <a:r>
-              <a:rPr lang="de-CH" b="1" dirty="0"/>
-              <a:t>)</a:t>
-            </a:r>
-            <a:endParaRPr lang="en-CH" b="1" dirty="0"/>
-          </a:p>
-        </p:txBody>
-      </p:sp>
-      <p:pic>
-        <p:nvPicPr>
-          <p:cNvPr id="12" name="Graphic 11" descr="Magnifying glass with solid fill">
-            <a:extLst>
-              <a:ext uri="{FF2B5EF4-FFF2-40B4-BE49-F238E27FC236}">
-                <a16:creationId xmlns:a16="http://schemas.microsoft.com/office/drawing/2014/main" id="{0003CB08-8DB6-DF40-BC93-8D5909B78794}"/>
-              </a:ext>
-            </a:extLst>
-          </p:cNvPr>
-          <p:cNvPicPr>
-            <a:picLocks noChangeAspect="1"/>
-          </p:cNvPicPr>
-          <p:nvPr/>
-        </p:nvPicPr>
-        <p:blipFill>
-          <a:blip r:embed="rId5">
-            <a:extLst>
-              <a:ext uri="{96DAC541-7B7A-43D3-8B79-37D633B846F1}">
-                <asvg:svgBlip xmlns:asvg="http://schemas.microsoft.com/office/drawing/2016/SVG/main" r:embed="rId6"/>
-              </a:ext>
-            </a:extLst>
-          </a:blip>
-          <a:stretch>
-            <a:fillRect/>
-          </a:stretch>
-        </p:blipFill>
-        <p:spPr>
-          <a:xfrm>
-            <a:off x="4080289" y="3108310"/>
-            <a:ext cx="914400" cy="914400"/>
-          </a:xfrm>
-          <a:prstGeom prst="rect">
-            <a:avLst/>
-          </a:prstGeom>
-        </p:spPr>
-      </p:pic>
-      <p:cxnSp>
-        <p:nvCxnSpPr>
-          <p:cNvPr id="51" name="Straight Arrow Connector 50">
-            <a:extLst>
-              <a:ext uri="{FF2B5EF4-FFF2-40B4-BE49-F238E27FC236}">
-                <a16:creationId xmlns:a16="http://schemas.microsoft.com/office/drawing/2014/main" id="{94EA0891-CC33-0742-9801-810E55CFA752}"/>
-              </a:ext>
-            </a:extLst>
-          </p:cNvPr>
-          <p:cNvCxnSpPr>
-            <a:cxnSpLocks/>
-            <a:stCxn id="6" idx="2"/>
-            <a:endCxn id="47" idx="0"/>
-          </p:cNvCxnSpPr>
-          <p:nvPr/>
-        </p:nvCxnSpPr>
-        <p:spPr>
-          <a:xfrm>
-            <a:off x="5070064" y="2785314"/>
-            <a:ext cx="12879" cy="322996"/>
-          </a:xfrm>
-          <a:prstGeom prst="straightConnector1">
-            <a:avLst/>
-          </a:prstGeom>
-          <a:ln w="76200">
-            <a:solidFill>
-              <a:schemeClr val="accent5">
-                <a:lumMod val="60000"/>
-                <a:lumOff val="40000"/>
-              </a:schemeClr>
-            </a:solidFill>
-            <a:tailEnd type="triangle"/>
-          </a:ln>
-        </p:spPr>
-        <p:style>
-          <a:lnRef idx="1">
-            <a:schemeClr val="accent1"/>
-          </a:lnRef>
-          <a:fillRef idx="0">
-            <a:schemeClr val="accent1"/>
-          </a:fillRef>
-          <a:effectRef idx="0">
-            <a:schemeClr val="accent1"/>
-          </a:effectRef>
-          <a:fontRef idx="minor">
-            <a:schemeClr val="tx1"/>
-          </a:fontRef>
-        </p:style>
-      </p:cxnSp>
-      <p:sp>
-        <p:nvSpPr>
-          <p:cNvPr id="54" name="Rounded Rectangle 53">
-            <a:extLst>
-              <a:ext uri="{FF2B5EF4-FFF2-40B4-BE49-F238E27FC236}">
-                <a16:creationId xmlns:a16="http://schemas.microsoft.com/office/drawing/2014/main" id="{A929B00C-C7CC-A048-B894-D9C3C1B2C914}"/>
-              </a:ext>
-            </a:extLst>
-          </p:cNvPr>
-          <p:cNvSpPr/>
-          <p:nvPr/>
-        </p:nvSpPr>
-        <p:spPr>
-          <a:xfrm>
-            <a:off x="4077168" y="4375687"/>
-            <a:ext cx="2042052" cy="944380"/>
-          </a:xfrm>
-          <a:prstGeom prst="roundRect">
-            <a:avLst/>
-          </a:prstGeom>
-          <a:solidFill>
-            <a:srgbClr val="001489"/>
-          </a:solidFill>
-        </p:spPr>
-        <p:style>
-          <a:lnRef idx="2">
-            <a:schemeClr val="accent1">
-              <a:shade val="50000"/>
-            </a:schemeClr>
-          </a:lnRef>
-          <a:fillRef idx="1">
-            <a:schemeClr val="accent1"/>
-          </a:fillRef>
-          <a:effectRef idx="0">
-            <a:schemeClr val="accent1"/>
-          </a:effectRef>
-          <a:fontRef idx="minor">
-            <a:schemeClr val="lt1"/>
-          </a:fontRef>
-        </p:style>
-        <p:txBody>
-          <a:bodyPr rtlCol="0" anchor="ctr"/>
-          <a:lstStyle/>
-          <a:p>
-            <a:pPr algn="r"/>
-            <a:r>
-              <a:rPr lang="de-CH" b="1" dirty="0" err="1"/>
-              <a:t>article</a:t>
-            </a:r>
-            <a:endParaRPr lang="de-CH" b="1" dirty="0"/>
-          </a:p>
-          <a:p>
-            <a:pPr algn="r"/>
-            <a:r>
-              <a:rPr lang="de-CH" b="1" dirty="0" err="1"/>
-              <a:t>pages</a:t>
-            </a:r>
-            <a:endParaRPr lang="de-CH" b="1" dirty="0"/>
-          </a:p>
-          <a:p>
-            <a:pPr algn="r"/>
-            <a:r>
-              <a:rPr lang="de-CH" b="1" dirty="0" err="1"/>
-              <a:t>requests</a:t>
-            </a:r>
-            <a:endParaRPr lang="en-CH" b="1" dirty="0"/>
-          </a:p>
-        </p:txBody>
-      </p:sp>
-      <p:pic>
-        <p:nvPicPr>
-          <p:cNvPr id="57" name="Graphic 56" descr="Web design with solid fill">
-            <a:extLst>
-              <a:ext uri="{FF2B5EF4-FFF2-40B4-BE49-F238E27FC236}">
-                <a16:creationId xmlns:a16="http://schemas.microsoft.com/office/drawing/2014/main" id="{B3D71BF8-B185-CE44-9C6E-E477EEEE4958}"/>
-              </a:ext>
-            </a:extLst>
-          </p:cNvPr>
-          <p:cNvPicPr>
-            <a:picLocks noChangeAspect="1"/>
-          </p:cNvPicPr>
-          <p:nvPr/>
-        </p:nvPicPr>
-        <p:blipFill>
-          <a:blip r:embed="rId3">
-            <a:extLst>
-              <a:ext uri="{96DAC541-7B7A-43D3-8B79-37D633B846F1}">
-                <asvg:svgBlip xmlns:asvg="http://schemas.microsoft.com/office/drawing/2016/SVG/main" r:embed="rId4"/>
-              </a:ext>
-            </a:extLst>
-          </a:blip>
-          <a:stretch>
-            <a:fillRect/>
-          </a:stretch>
-        </p:blipFill>
-        <p:spPr>
-          <a:xfrm>
-            <a:off x="4296464" y="4498764"/>
-            <a:ext cx="698225" cy="698225"/>
-          </a:xfrm>
-          <a:prstGeom prst="rect">
-            <a:avLst/>
-          </a:prstGeom>
-        </p:spPr>
-      </p:pic>
-      <p:sp>
-        <p:nvSpPr>
-          <p:cNvPr id="59" name="TextBox 58">
-            <a:extLst>
-              <a:ext uri="{FF2B5EF4-FFF2-40B4-BE49-F238E27FC236}">
-                <a16:creationId xmlns:a16="http://schemas.microsoft.com/office/drawing/2014/main" id="{47623EFA-DC4E-AB49-A10D-5103D9DE75DB}"/>
-              </a:ext>
-            </a:extLst>
-          </p:cNvPr>
-          <p:cNvSpPr txBox="1"/>
-          <p:nvPr/>
-        </p:nvSpPr>
-        <p:spPr>
-          <a:xfrm>
-            <a:off x="1649836" y="4775726"/>
-            <a:ext cx="1854542" cy="523220"/>
-          </a:xfrm>
-          <a:prstGeom prst="rect">
-            <a:avLst/>
-          </a:prstGeom>
-          <a:noFill/>
-        </p:spPr>
-        <p:txBody>
-          <a:bodyPr wrap="square" rtlCol="0">
-            <a:spAutoFit/>
-          </a:bodyPr>
-          <a:lstStyle/>
-          <a:p>
-            <a:pPr algn="ctr"/>
-            <a:r>
-              <a:rPr lang="en-GB" sz="1400" dirty="0">
-                <a:solidFill>
-                  <a:srgbClr val="001489"/>
-                </a:solidFill>
-              </a:rPr>
-              <a:t>https://</a:t>
-            </a:r>
-            <a:r>
-              <a:rPr lang="en-GB" sz="1400" dirty="0" err="1">
-                <a:solidFill>
-                  <a:srgbClr val="001489"/>
-                </a:solidFill>
-              </a:rPr>
-              <a:t>finance.yahoo.com</a:t>
-            </a:r>
-            <a:r>
-              <a:rPr lang="en-GB" sz="1400" dirty="0">
-                <a:solidFill>
-                  <a:srgbClr val="001489"/>
-                </a:solidFill>
-              </a:rPr>
-              <a:t>/.../</a:t>
-            </a:r>
-            <a:endParaRPr lang="en-CH" sz="1400" dirty="0">
-              <a:solidFill>
-                <a:srgbClr val="001489"/>
-              </a:solidFill>
-            </a:endParaRPr>
-          </a:p>
-        </p:txBody>
-      </p:sp>
-      <p:pic>
-        <p:nvPicPr>
-          <p:cNvPr id="68" name="Graphic 67" descr="Web design with solid fill">
-            <a:extLst>
-              <a:ext uri="{FF2B5EF4-FFF2-40B4-BE49-F238E27FC236}">
-                <a16:creationId xmlns:a16="http://schemas.microsoft.com/office/drawing/2014/main" id="{EDE23C28-871E-634A-8E05-FBE4A69D4254}"/>
-              </a:ext>
-            </a:extLst>
-          </p:cNvPr>
-          <p:cNvPicPr>
-            <a:picLocks noChangeAspect="1"/>
-          </p:cNvPicPr>
-          <p:nvPr/>
-        </p:nvPicPr>
-        <p:blipFill>
-          <a:blip r:embed="rId7">
-            <a:extLst>
-              <a:ext uri="{96DAC541-7B7A-43D3-8B79-37D633B846F1}">
-                <asvg:svgBlip xmlns:asvg="http://schemas.microsoft.com/office/drawing/2016/SVG/main" r:embed="rId8"/>
-              </a:ext>
-            </a:extLst>
-          </a:blip>
-          <a:stretch>
-            <a:fillRect/>
-          </a:stretch>
-        </p:blipFill>
-        <p:spPr>
-          <a:xfrm>
-            <a:off x="2151305" y="1964010"/>
-            <a:ext cx="698225" cy="698225"/>
-          </a:xfrm>
-          <a:prstGeom prst="rect">
-            <a:avLst/>
-          </a:prstGeom>
-        </p:spPr>
-      </p:pic>
-      <p:pic>
-        <p:nvPicPr>
-          <p:cNvPr id="69" name="Graphic 68" descr="Web design with solid fill">
-            <a:extLst>
-              <a:ext uri="{FF2B5EF4-FFF2-40B4-BE49-F238E27FC236}">
-                <a16:creationId xmlns:a16="http://schemas.microsoft.com/office/drawing/2014/main" id="{DCB4A7C6-AAAA-8A43-9CD2-87D62F787A22}"/>
-              </a:ext>
-            </a:extLst>
-          </p:cNvPr>
-          <p:cNvPicPr>
-            <a:picLocks noChangeAspect="1"/>
-          </p:cNvPicPr>
-          <p:nvPr/>
-        </p:nvPicPr>
-        <p:blipFill>
-          <a:blip r:embed="rId7">
-            <a:extLst>
-              <a:ext uri="{96DAC541-7B7A-43D3-8B79-37D633B846F1}">
-                <asvg:svgBlip xmlns:asvg="http://schemas.microsoft.com/office/drawing/2016/SVG/main" r:embed="rId8"/>
-              </a:ext>
-            </a:extLst>
-          </a:blip>
-          <a:stretch>
-            <a:fillRect/>
-          </a:stretch>
-        </p:blipFill>
-        <p:spPr>
-          <a:xfrm>
-            <a:off x="1737655" y="4434226"/>
-            <a:ext cx="413650" cy="413650"/>
-          </a:xfrm>
-          <a:prstGeom prst="rect">
-            <a:avLst/>
-          </a:prstGeom>
-        </p:spPr>
-      </p:pic>
-      <p:pic>
-        <p:nvPicPr>
-          <p:cNvPr id="70" name="Graphic 69" descr="Web design with solid fill">
-            <a:extLst>
-              <a:ext uri="{FF2B5EF4-FFF2-40B4-BE49-F238E27FC236}">
-                <a16:creationId xmlns:a16="http://schemas.microsoft.com/office/drawing/2014/main" id="{D6B4F652-DE3B-BE45-8A9D-3461E288C760}"/>
-              </a:ext>
-            </a:extLst>
-          </p:cNvPr>
-          <p:cNvPicPr>
-            <a:picLocks noChangeAspect="1"/>
-          </p:cNvPicPr>
-          <p:nvPr/>
-        </p:nvPicPr>
-        <p:blipFill>
-          <a:blip r:embed="rId7">
-            <a:extLst>
-              <a:ext uri="{96DAC541-7B7A-43D3-8B79-37D633B846F1}">
-                <asvg:svgBlip xmlns:asvg="http://schemas.microsoft.com/office/drawing/2016/SVG/main" r:embed="rId8"/>
-              </a:ext>
-            </a:extLst>
-          </a:blip>
-          <a:stretch>
-            <a:fillRect/>
-          </a:stretch>
-        </p:blipFill>
-        <p:spPr>
-          <a:xfrm>
-            <a:off x="2111498" y="4434226"/>
-            <a:ext cx="413650" cy="413650"/>
-          </a:xfrm>
-          <a:prstGeom prst="rect">
-            <a:avLst/>
-          </a:prstGeom>
-        </p:spPr>
-      </p:pic>
-      <p:pic>
-        <p:nvPicPr>
-          <p:cNvPr id="71" name="Graphic 70" descr="Web design with solid fill">
-            <a:extLst>
-              <a:ext uri="{FF2B5EF4-FFF2-40B4-BE49-F238E27FC236}">
-                <a16:creationId xmlns:a16="http://schemas.microsoft.com/office/drawing/2014/main" id="{8795E38F-3C9A-0545-9A51-0E14CE4E41D2}"/>
-              </a:ext>
-            </a:extLst>
-          </p:cNvPr>
-          <p:cNvPicPr>
-            <a:picLocks noChangeAspect="1"/>
-          </p:cNvPicPr>
-          <p:nvPr/>
-        </p:nvPicPr>
-        <p:blipFill>
-          <a:blip r:embed="rId7">
-            <a:extLst>
-              <a:ext uri="{96DAC541-7B7A-43D3-8B79-37D633B846F1}">
-                <asvg:svgBlip xmlns:asvg="http://schemas.microsoft.com/office/drawing/2016/SVG/main" r:embed="rId8"/>
-              </a:ext>
-            </a:extLst>
-          </a:blip>
-          <a:stretch>
-            <a:fillRect/>
-          </a:stretch>
-        </p:blipFill>
-        <p:spPr>
-          <a:xfrm>
-            <a:off x="2500417" y="4434226"/>
-            <a:ext cx="413650" cy="413650"/>
-          </a:xfrm>
-          <a:prstGeom prst="rect">
-            <a:avLst/>
-          </a:prstGeom>
-        </p:spPr>
-      </p:pic>
-      <p:pic>
-        <p:nvPicPr>
-          <p:cNvPr id="73" name="Graphic 72" descr="Web design with solid fill">
-            <a:extLst>
-              <a:ext uri="{FF2B5EF4-FFF2-40B4-BE49-F238E27FC236}">
-                <a16:creationId xmlns:a16="http://schemas.microsoft.com/office/drawing/2014/main" id="{F9782797-37C0-BB43-8231-D1ADDA8F746A}"/>
-              </a:ext>
-            </a:extLst>
-          </p:cNvPr>
-          <p:cNvPicPr>
-            <a:picLocks noChangeAspect="1"/>
-          </p:cNvPicPr>
-          <p:nvPr/>
-        </p:nvPicPr>
-        <p:blipFill>
-          <a:blip r:embed="rId7">
-            <a:extLst>
-              <a:ext uri="{96DAC541-7B7A-43D3-8B79-37D633B846F1}">
-                <asvg:svgBlip xmlns:asvg="http://schemas.microsoft.com/office/drawing/2016/SVG/main" r:embed="rId8"/>
-              </a:ext>
-            </a:extLst>
-          </a:blip>
-          <a:stretch>
-            <a:fillRect/>
-          </a:stretch>
-        </p:blipFill>
-        <p:spPr>
-          <a:xfrm>
-            <a:off x="2906613" y="4434226"/>
-            <a:ext cx="413650" cy="413650"/>
-          </a:xfrm>
-          <a:prstGeom prst="rect">
-            <a:avLst/>
-          </a:prstGeom>
-        </p:spPr>
-      </p:pic>
-      <p:cxnSp>
-        <p:nvCxnSpPr>
-          <p:cNvPr id="74" name="Straight Arrow Connector 73">
-            <a:extLst>
-              <a:ext uri="{FF2B5EF4-FFF2-40B4-BE49-F238E27FC236}">
-                <a16:creationId xmlns:a16="http://schemas.microsoft.com/office/drawing/2014/main" id="{913651D1-AE49-A046-B40E-9A5C8CCE5237}"/>
-              </a:ext>
-            </a:extLst>
-          </p:cNvPr>
-          <p:cNvCxnSpPr>
-            <a:cxnSpLocks/>
-          </p:cNvCxnSpPr>
-          <p:nvPr/>
-        </p:nvCxnSpPr>
-        <p:spPr>
-          <a:xfrm flipH="1" flipV="1">
-            <a:off x="3334657" y="4847876"/>
-            <a:ext cx="727260" cy="1"/>
-          </a:xfrm>
-          <a:prstGeom prst="straightConnector1">
-            <a:avLst/>
-          </a:prstGeom>
-          <a:ln w="76200">
-            <a:solidFill>
-              <a:schemeClr val="accent5">
-                <a:lumMod val="60000"/>
-                <a:lumOff val="40000"/>
-              </a:schemeClr>
-            </a:solidFill>
-            <a:headEnd type="triangle" w="med" len="med"/>
-            <a:tailEnd type="triangle" w="med" len="med"/>
-          </a:ln>
-        </p:spPr>
-        <p:style>
-          <a:lnRef idx="1">
-            <a:schemeClr val="accent1"/>
-          </a:lnRef>
-          <a:fillRef idx="0">
-            <a:schemeClr val="accent1"/>
-          </a:fillRef>
-          <a:effectRef idx="0">
-            <a:schemeClr val="accent1"/>
-          </a:effectRef>
-          <a:fontRef idx="minor">
-            <a:schemeClr val="tx1"/>
-          </a:fontRef>
-        </p:style>
-      </p:cxnSp>
-      <p:sp>
-        <p:nvSpPr>
-          <p:cNvPr id="21" name="Circular Arrow 20">
-            <a:extLst>
-              <a:ext uri="{FF2B5EF4-FFF2-40B4-BE49-F238E27FC236}">
-                <a16:creationId xmlns:a16="http://schemas.microsoft.com/office/drawing/2014/main" id="{CADF267B-AB7F-6742-96F8-EE77A5AB4CAA}"/>
-              </a:ext>
-            </a:extLst>
-          </p:cNvPr>
-          <p:cNvSpPr/>
-          <p:nvPr/>
-        </p:nvSpPr>
-        <p:spPr>
-          <a:xfrm rot="5072906">
-            <a:off x="5909129" y="2921280"/>
-            <a:ext cx="732825" cy="2404041"/>
-          </a:xfrm>
-          <a:prstGeom prst="circularArrow">
-            <a:avLst>
-              <a:gd name="adj1" fmla="val 22036"/>
-              <a:gd name="adj2" fmla="val 1142319"/>
-              <a:gd name="adj3" fmla="val 20850065"/>
-              <a:gd name="adj4" fmla="val 10800000"/>
-              <a:gd name="adj5" fmla="val 12500"/>
-            </a:avLst>
-          </a:prstGeom>
-          <a:ln w="76200">
-            <a:solidFill>
-              <a:schemeClr val="accent5">
-                <a:lumMod val="60000"/>
-                <a:lumOff val="40000"/>
-              </a:schemeClr>
-            </a:solidFill>
-            <a:tailEnd type="triangle"/>
-          </a:ln>
-        </p:spPr>
-        <p:style>
-          <a:lnRef idx="1">
-            <a:schemeClr val="accent1"/>
-          </a:lnRef>
-          <a:fillRef idx="0">
-            <a:schemeClr val="accent1"/>
-          </a:fillRef>
-          <a:effectRef idx="0">
-            <a:schemeClr val="accent1"/>
-          </a:effectRef>
-          <a:fontRef idx="minor">
-            <a:schemeClr val="tx1"/>
-          </a:fontRef>
-        </p:style>
-        <p:txBody>
-          <a:bodyPr rtlCol="0" anchor="ctr"/>
-          <a:lstStyle/>
-          <a:p>
-            <a:pPr algn="ctr"/>
-            <a:endParaRPr lang="en-CH">
-              <a:solidFill>
-                <a:schemeClr val="tx1"/>
-              </a:solidFill>
-            </a:endParaRPr>
-          </a:p>
-        </p:txBody>
-      </p:sp>
-      <p:cxnSp>
-        <p:nvCxnSpPr>
-          <p:cNvPr id="82" name="Straight Arrow Connector 81">
-            <a:extLst>
-              <a:ext uri="{FF2B5EF4-FFF2-40B4-BE49-F238E27FC236}">
-                <a16:creationId xmlns:a16="http://schemas.microsoft.com/office/drawing/2014/main" id="{CF347DA5-EE83-0645-A556-1708567CB81A}"/>
-              </a:ext>
-            </a:extLst>
-          </p:cNvPr>
-          <p:cNvCxnSpPr>
-            <a:cxnSpLocks/>
-            <a:stCxn id="54" idx="3"/>
-          </p:cNvCxnSpPr>
-          <p:nvPr/>
-        </p:nvCxnSpPr>
-        <p:spPr>
-          <a:xfrm flipV="1">
-            <a:off x="6119220" y="4847876"/>
-            <a:ext cx="1353073" cy="1"/>
-          </a:xfrm>
-          <a:prstGeom prst="straightConnector1">
-            <a:avLst/>
-          </a:prstGeom>
-          <a:ln w="76200">
-            <a:solidFill>
-              <a:schemeClr val="accent5">
-                <a:lumMod val="60000"/>
-                <a:lumOff val="40000"/>
-              </a:schemeClr>
-            </a:solidFill>
-            <a:tailEnd type="triangle"/>
-          </a:ln>
-        </p:spPr>
-        <p:style>
-          <a:lnRef idx="1">
-            <a:schemeClr val="accent1"/>
-          </a:lnRef>
-          <a:fillRef idx="0">
-            <a:schemeClr val="accent1"/>
-          </a:fillRef>
-          <a:effectRef idx="0">
-            <a:schemeClr val="accent1"/>
-          </a:effectRef>
-          <a:fontRef idx="minor">
-            <a:schemeClr val="tx1"/>
-          </a:fontRef>
-        </p:style>
-      </p:cxnSp>
-      <p:sp>
-        <p:nvSpPr>
-          <p:cNvPr id="84" name="Rounded Rectangle 83">
-            <a:extLst>
-              <a:ext uri="{FF2B5EF4-FFF2-40B4-BE49-F238E27FC236}">
-                <a16:creationId xmlns:a16="http://schemas.microsoft.com/office/drawing/2014/main" id="{CE53A25B-55DC-3B4B-8804-A3A9D5AC5F2F}"/>
-              </a:ext>
-            </a:extLst>
-          </p:cNvPr>
-          <p:cNvSpPr/>
-          <p:nvPr/>
-        </p:nvSpPr>
-        <p:spPr>
-          <a:xfrm>
-            <a:off x="7615767" y="4405667"/>
-            <a:ext cx="2042052" cy="944380"/>
-          </a:xfrm>
-          <a:prstGeom prst="roundRect">
-            <a:avLst/>
-          </a:prstGeom>
-          <a:solidFill>
-            <a:srgbClr val="001489"/>
-          </a:solidFill>
-        </p:spPr>
-        <p:style>
-          <a:lnRef idx="2">
-            <a:schemeClr val="accent1">
-              <a:shade val="50000"/>
-            </a:schemeClr>
-          </a:lnRef>
-          <a:fillRef idx="1">
-            <a:schemeClr val="accent1"/>
-          </a:fillRef>
-          <a:effectRef idx="0">
-            <a:schemeClr val="accent1"/>
-          </a:effectRef>
-          <a:fontRef idx="minor">
-            <a:schemeClr val="lt1"/>
-          </a:fontRef>
-        </p:style>
-        <p:txBody>
-          <a:bodyPr rtlCol="0" anchor="ctr"/>
-          <a:lstStyle/>
-          <a:p>
-            <a:pPr algn="r"/>
-            <a:r>
-              <a:rPr lang="de-CH" b="1" dirty="0"/>
-              <a:t>parse</a:t>
-            </a:r>
-          </a:p>
-          <a:p>
-            <a:pPr algn="r"/>
-            <a:r>
-              <a:rPr lang="de-CH" b="1" dirty="0"/>
-              <a:t>title, </a:t>
-            </a:r>
-            <a:r>
-              <a:rPr lang="de-CH" b="1" dirty="0" err="1"/>
-              <a:t>body</a:t>
-            </a:r>
-            <a:r>
-              <a:rPr lang="de-CH" b="1" dirty="0"/>
-              <a:t>,</a:t>
-            </a:r>
-          </a:p>
-          <a:p>
-            <a:pPr algn="r"/>
-            <a:r>
-              <a:rPr lang="de-CH" b="1" dirty="0" err="1"/>
-              <a:t>date</a:t>
-            </a:r>
-            <a:endParaRPr lang="en-CH" b="1" dirty="0"/>
-          </a:p>
-        </p:txBody>
-      </p:sp>
-      <p:pic>
-        <p:nvPicPr>
-          <p:cNvPr id="86" name="Graphic 85" descr="Magnifying glass with solid fill">
-            <a:extLst>
-              <a:ext uri="{FF2B5EF4-FFF2-40B4-BE49-F238E27FC236}">
-                <a16:creationId xmlns:a16="http://schemas.microsoft.com/office/drawing/2014/main" id="{F43728BF-DC6B-754B-8A29-E28CFDFD5C43}"/>
-              </a:ext>
-            </a:extLst>
-          </p:cNvPr>
-          <p:cNvPicPr>
-            <a:picLocks noChangeAspect="1"/>
-          </p:cNvPicPr>
-          <p:nvPr/>
-        </p:nvPicPr>
-        <p:blipFill>
-          <a:blip r:embed="rId5">
-            <a:extLst>
-              <a:ext uri="{96DAC541-7B7A-43D3-8B79-37D633B846F1}">
-                <asvg:svgBlip xmlns:asvg="http://schemas.microsoft.com/office/drawing/2016/SVG/main" r:embed="rId6"/>
-              </a:ext>
-            </a:extLst>
-          </a:blip>
-          <a:stretch>
-            <a:fillRect/>
-          </a:stretch>
-        </p:blipFill>
-        <p:spPr>
-          <a:xfrm>
-            <a:off x="7634139" y="4405667"/>
-            <a:ext cx="914400" cy="914400"/>
-          </a:xfrm>
-          <a:prstGeom prst="rect">
-            <a:avLst/>
-          </a:prstGeom>
-        </p:spPr>
-      </p:pic>
-      <p:sp>
-        <p:nvSpPr>
-          <p:cNvPr id="87" name="Rounded Rectangle 86">
-            <a:extLst>
-              <a:ext uri="{FF2B5EF4-FFF2-40B4-BE49-F238E27FC236}">
-                <a16:creationId xmlns:a16="http://schemas.microsoft.com/office/drawing/2014/main" id="{2E42D35D-16F8-B648-A3A8-FF1624ED79B0}"/>
-              </a:ext>
-            </a:extLst>
-          </p:cNvPr>
-          <p:cNvSpPr/>
-          <p:nvPr/>
-        </p:nvSpPr>
-        <p:spPr>
-          <a:xfrm>
-            <a:off x="7896560" y="3087665"/>
-            <a:ext cx="1303958" cy="985670"/>
-          </a:xfrm>
-          <a:prstGeom prst="roundRect">
-            <a:avLst/>
-          </a:prstGeom>
-          <a:solidFill>
-            <a:srgbClr val="001489"/>
-          </a:solidFill>
-        </p:spPr>
-        <p:style>
-          <a:lnRef idx="2">
-            <a:schemeClr val="accent1">
-              <a:shade val="50000"/>
-            </a:schemeClr>
-          </a:lnRef>
-          <a:fillRef idx="1">
-            <a:schemeClr val="accent1"/>
-          </a:fillRef>
-          <a:effectRef idx="0">
-            <a:schemeClr val="accent1"/>
-          </a:effectRef>
-          <a:fontRef idx="minor">
-            <a:schemeClr val="lt1"/>
-          </a:fontRef>
-        </p:style>
-        <p:txBody>
-          <a:bodyPr rtlCol="0" anchor="ctr"/>
-          <a:lstStyle/>
-          <a:p>
-            <a:pPr algn="r"/>
-            <a:r>
-              <a:rPr lang="de-CH" b="1" dirty="0" err="1"/>
-              <a:t>csv</a:t>
-            </a:r>
-            <a:endParaRPr lang="en-CH" b="1" dirty="0"/>
-          </a:p>
-        </p:txBody>
-      </p:sp>
-      <p:pic>
-        <p:nvPicPr>
-          <p:cNvPr id="27" name="Graphic 26" descr="Open folder outline">
-            <a:extLst>
-              <a:ext uri="{FF2B5EF4-FFF2-40B4-BE49-F238E27FC236}">
-                <a16:creationId xmlns:a16="http://schemas.microsoft.com/office/drawing/2014/main" id="{6D6E2C8D-F0C6-8949-B161-384833189FA6}"/>
-              </a:ext>
-            </a:extLst>
-          </p:cNvPr>
-          <p:cNvPicPr>
-            <a:picLocks noChangeAspect="1"/>
-          </p:cNvPicPr>
-          <p:nvPr/>
-        </p:nvPicPr>
-        <p:blipFill>
-          <a:blip r:embed="rId9">
-            <a:extLst>
-              <a:ext uri="{96DAC541-7B7A-43D3-8B79-37D633B846F1}">
-                <asvg:svgBlip xmlns:asvg="http://schemas.microsoft.com/office/drawing/2016/SVG/main" r:embed="rId10"/>
-              </a:ext>
-            </a:extLst>
-          </a:blip>
-          <a:stretch>
-            <a:fillRect/>
-          </a:stretch>
-        </p:blipFill>
-        <p:spPr>
-          <a:xfrm>
-            <a:off x="7948899" y="3214588"/>
-            <a:ext cx="759183" cy="759183"/>
-          </a:xfrm>
-          <a:prstGeom prst="rect">
-            <a:avLst/>
-          </a:prstGeom>
-        </p:spPr>
-      </p:pic>
-      <p:cxnSp>
-        <p:nvCxnSpPr>
-          <p:cNvPr id="90" name="Straight Arrow Connector 89">
-            <a:extLst>
-              <a:ext uri="{FF2B5EF4-FFF2-40B4-BE49-F238E27FC236}">
-                <a16:creationId xmlns:a16="http://schemas.microsoft.com/office/drawing/2014/main" id="{08C2B415-7AD6-084A-AC78-4EF299D04ED8}"/>
-              </a:ext>
-            </a:extLst>
-          </p:cNvPr>
-          <p:cNvCxnSpPr>
-            <a:cxnSpLocks/>
-            <a:stCxn id="84" idx="0"/>
-            <a:endCxn id="87" idx="2"/>
-          </p:cNvCxnSpPr>
-          <p:nvPr/>
-        </p:nvCxnSpPr>
-        <p:spPr>
-          <a:xfrm flipH="1" flipV="1">
-            <a:off x="8548539" y="4073335"/>
-            <a:ext cx="88254" cy="332332"/>
-          </a:xfrm>
-          <a:prstGeom prst="straightConnector1">
-            <a:avLst/>
-          </a:prstGeom>
-          <a:ln w="76200">
-            <a:solidFill>
-              <a:schemeClr val="accent5">
-                <a:lumMod val="60000"/>
-                <a:lumOff val="40000"/>
-              </a:schemeClr>
-            </a:solidFill>
-            <a:tailEnd type="triangle"/>
-          </a:ln>
-        </p:spPr>
-        <p:style>
-          <a:lnRef idx="1">
-            <a:schemeClr val="accent1"/>
-          </a:lnRef>
-          <a:fillRef idx="0">
-            <a:schemeClr val="accent1"/>
-          </a:fillRef>
-          <a:effectRef idx="0">
-            <a:schemeClr val="accent1"/>
-          </a:effectRef>
-          <a:fontRef idx="minor">
-            <a:schemeClr val="tx1"/>
-          </a:fontRef>
-        </p:style>
-      </p:cxnSp>
+            <a:pPr marL="285750" indent="-285750">
+              <a:buFont typeface="Wingdings" pitchFamily="2" charset="2"/>
+              <a:buChar char="ü"/>
+            </a:pPr>
+            <a:r>
+              <a:rPr lang="en-CH" b="1" dirty="0"/>
+              <a:t>Harversted data</a:t>
+            </a:r>
+            <a:r>
+              <a:rPr lang="en-CH" dirty="0"/>
+              <a:t> (1.2MB) and </a:t>
+            </a:r>
+            <a:r>
+              <a:rPr lang="en-CH" b="1" dirty="0"/>
+              <a:t>model</a:t>
+            </a:r>
+            <a:r>
+              <a:rPr lang="en-CH" dirty="0"/>
+              <a:t> (291kB) are lightweigth: Scaling and requests should not produce any stretches mid-term</a:t>
+            </a:r>
+          </a:p>
+          <a:p>
+            <a:pPr marL="285750" indent="-285750">
+              <a:buFont typeface="Wingdings" pitchFamily="2" charset="2"/>
+              <a:buChar char="ü"/>
+            </a:pPr>
+            <a:endParaRPr lang="en-CH" dirty="0"/>
+          </a:p>
+          <a:p>
+            <a:pPr marL="285750" indent="-285750">
+              <a:buFont typeface="Wingdings" pitchFamily="2" charset="2"/>
+              <a:buChar char="Ø"/>
+            </a:pPr>
+            <a:r>
+              <a:rPr lang="en-CH" dirty="0"/>
+              <a:t>Consider however building an </a:t>
+            </a:r>
+            <a:r>
+              <a:rPr lang="en-CH" b="1" dirty="0"/>
+              <a:t>API</a:t>
+            </a:r>
+            <a:r>
+              <a:rPr lang="en-CH" dirty="0"/>
+              <a:t> in case the project takes off on user side (quant analysts, …)</a:t>
+            </a:r>
+          </a:p>
+          <a:p>
+            <a:pPr marL="285750" indent="-285750">
+              <a:buFont typeface="Wingdings" pitchFamily="2" charset="2"/>
+              <a:buChar char="ü"/>
+            </a:pPr>
+            <a:endParaRPr lang="en-CH" dirty="0"/>
+          </a:p>
+          <a:p>
+            <a:pPr marL="285750" indent="-285750">
+              <a:buFont typeface="Wingdings" pitchFamily="2" charset="2"/>
+              <a:buChar char="§"/>
+            </a:pPr>
+            <a:r>
+              <a:rPr lang="en-CH" dirty="0"/>
+              <a:t>Daily jobs: </a:t>
+            </a:r>
+          </a:p>
+          <a:p>
+            <a:pPr marL="285750" indent="-285750">
+              <a:buFont typeface="Wingdings" pitchFamily="2" charset="2"/>
+              <a:buChar char="§"/>
+            </a:pPr>
+            <a:endParaRPr lang="en-CH" dirty="0"/>
+          </a:p>
+          <a:p>
+            <a:pPr marL="742950" lvl="1" indent="-285750">
+              <a:buFont typeface="Wingdings" pitchFamily="2" charset="2"/>
+              <a:buChar char="Ø"/>
+            </a:pPr>
+            <a:r>
+              <a:rPr lang="en-CH" b="1" dirty="0"/>
+              <a:t>Webcrawler</a:t>
+            </a:r>
+            <a:r>
+              <a:rPr lang="en-CH" dirty="0"/>
+              <a:t>: Daily jobs access a limited amount of articles (20-50). Performance to be revisited as soon as additional websources are crawled.</a:t>
+            </a:r>
+          </a:p>
+          <a:p>
+            <a:pPr marL="742950" lvl="1" indent="-285750">
+              <a:buFont typeface="Wingdings" pitchFamily="2" charset="2"/>
+              <a:buChar char="Ø"/>
+            </a:pPr>
+            <a:endParaRPr lang="en-CH" dirty="0"/>
+          </a:p>
+          <a:p>
+            <a:pPr marL="742950" lvl="1" indent="-285750">
+              <a:buFont typeface="Wingdings" pitchFamily="2" charset="2"/>
+              <a:buChar char="Ø"/>
+            </a:pPr>
+            <a:r>
+              <a:rPr lang="en-CH" b="1" dirty="0"/>
+              <a:t>Model refresh (NLP tasks)</a:t>
+            </a:r>
+            <a:r>
+              <a:rPr lang="en-CH" dirty="0"/>
+              <a:t>: Code performance to be ameliorated during future releases (list comprehensions, unnecessary if’s and looops) </a:t>
+            </a:r>
+            <a:br>
+              <a:rPr lang="en-CH" dirty="0"/>
+            </a:br>
+            <a:r>
+              <a:rPr lang="en-CH" b="1" dirty="0"/>
+              <a:t>=&gt; Backlog:	</a:t>
+            </a:r>
+            <a:br>
+              <a:rPr lang="en-CH" b="1" dirty="0"/>
+            </a:br>
+            <a:r>
+              <a:rPr lang="en-CH" b="1" dirty="0"/>
+              <a:t>      </a:t>
+            </a:r>
+            <a:r>
+              <a:rPr lang="en-CH" dirty="0"/>
+              <a:t>- Named entities + keyword extraction performance</a:t>
+            </a:r>
+            <a:br>
+              <a:rPr lang="en-CH" dirty="0"/>
+            </a:br>
+            <a:r>
+              <a:rPr lang="en-CH" dirty="0"/>
+              <a:t>      - Manage NLP-added data (features); currently, the model refresh runs for all crawled articles</a:t>
+            </a:r>
+          </a:p>
+          <a:p>
+            <a:pPr marL="742950" lvl="1" indent="-285750">
+              <a:buFont typeface="Wingdings" pitchFamily="2" charset="2"/>
+              <a:buChar char="Ø"/>
+            </a:pPr>
+            <a:endParaRPr lang="en-CH" dirty="0"/>
+          </a:p>
+          <a:p>
+            <a:pPr marL="285750" indent="-285750">
+              <a:buFont typeface="Wingdings" pitchFamily="2" charset="2"/>
+              <a:buChar char="Ø"/>
+            </a:pPr>
+            <a:r>
+              <a:rPr lang="en-CH" dirty="0"/>
+              <a:t>Further points to be considered for next releases: Backup of raw data and model, model versioning / governance</a:t>
+            </a:r>
+          </a:p>
+        </p:txBody>
+      </p:sp>
     </p:spTree>
     <p:extLst>
       <p:ext uri="{BB962C8B-B14F-4D97-AF65-F5344CB8AC3E}">
-        <p14:creationId xmlns:p14="http://schemas.microsoft.com/office/powerpoint/2010/main" val="1190263384"/>
+        <p14:creationId xmlns:p14="http://schemas.microsoft.com/office/powerpoint/2010/main" val="3476624544"/>
       </p:ext>
     </p:extLst>
   </p:cSld>

</xml_diff>